<commit_message>
changes how to page
</commit_message>
<xml_diff>
--- a/resources/how to.pptx
+++ b/resources/how to.pptx
@@ -2,11 +2,16 @@
 <file path=ppt/presentation.xml><?xml version="1.0" encoding="utf-8"?>
 <p:presentation xmlns:a="http://schemas.openxmlformats.org/drawingml/2006/main" xmlns:r="http://schemas.openxmlformats.org/officeDocument/2006/relationships" xmlns:p="http://schemas.openxmlformats.org/presentationml/2006/main" saveSubsetFonts="1" autoCompressPictures="0">
   <p:sldMasterIdLst>
-    <p:sldMasterId id="2147483660" r:id="rId1"/>
+    <p:sldMasterId id="2147483672" r:id="rId1"/>
   </p:sldMasterIdLst>
+  <p:notesMasterIdLst>
+    <p:notesMasterId r:id="rId6"/>
+  </p:notesMasterIdLst>
   <p:sldIdLst>
     <p:sldId id="256" r:id="rId2"/>
-    <p:sldId id="257" r:id="rId3"/>
+    <p:sldId id="258" r:id="rId3"/>
+    <p:sldId id="257" r:id="rId4"/>
+    <p:sldId id="259" r:id="rId5"/>
   </p:sldIdLst>
   <p:sldSz cx="9528175" cy="5715000"/>
   <p:notesSz cx="6858000" cy="9144000"/>
@@ -108,6 +113,507 @@
 </p:presentation>
 </file>
 
+<file path=ppt/notesMasters/notesMaster1.xml><?xml version="1.0" encoding="utf-8"?>
+<p:notesMaster xmlns:a="http://schemas.openxmlformats.org/drawingml/2006/main" xmlns:r="http://schemas.openxmlformats.org/officeDocument/2006/relationships" xmlns:p="http://schemas.openxmlformats.org/presentationml/2006/main">
+  <p:cSld>
+    <p:bg>
+      <p:bgRef idx="1001">
+        <a:schemeClr val="bg1"/>
+      </p:bgRef>
+    </p:bg>
+    <p:spTree>
+      <p:nvGrpSpPr>
+        <p:cNvPr id="1" name=""/>
+        <p:cNvGrpSpPr/>
+        <p:nvPr/>
+      </p:nvGrpSpPr>
+      <p:grpSpPr>
+        <a:xfrm>
+          <a:off x="0" y="0"/>
+          <a:ext cx="0" cy="0"/>
+          <a:chOff x="0" y="0"/>
+          <a:chExt cx="0" cy="0"/>
+        </a:xfrm>
+      </p:grpSpPr>
+      <p:sp>
+        <p:nvSpPr>
+          <p:cNvPr id="2" name="Header Placeholder 1"/>
+          <p:cNvSpPr>
+            <a:spLocks noGrp="1"/>
+          </p:cNvSpPr>
+          <p:nvPr>
+            <p:ph type="hdr" sz="quarter"/>
+          </p:nvPr>
+        </p:nvSpPr>
+        <p:spPr>
+          <a:xfrm>
+            <a:off x="0" y="0"/>
+            <a:ext cx="2971800" cy="457200"/>
+          </a:xfrm>
+          <a:prstGeom prst="rect">
+            <a:avLst/>
+          </a:prstGeom>
+        </p:spPr>
+        <p:txBody>
+          <a:bodyPr vert="horz" lIns="91440" tIns="45720" rIns="91440" bIns="45720" rtlCol="0"/>
+          <a:lstStyle>
+            <a:lvl1pPr algn="l">
+              <a:defRPr sz="1200"/>
+            </a:lvl1pPr>
+          </a:lstStyle>
+          <a:p>
+            <a:endParaRPr lang="en-US"/>
+          </a:p>
+        </p:txBody>
+      </p:sp>
+      <p:sp>
+        <p:nvSpPr>
+          <p:cNvPr id="3" name="Date Placeholder 2"/>
+          <p:cNvSpPr>
+            <a:spLocks noGrp="1"/>
+          </p:cNvSpPr>
+          <p:nvPr>
+            <p:ph type="dt" idx="1"/>
+          </p:nvPr>
+        </p:nvSpPr>
+        <p:spPr>
+          <a:xfrm>
+            <a:off x="3884613" y="0"/>
+            <a:ext cx="2971800" cy="457200"/>
+          </a:xfrm>
+          <a:prstGeom prst="rect">
+            <a:avLst/>
+          </a:prstGeom>
+        </p:spPr>
+        <p:txBody>
+          <a:bodyPr vert="horz" lIns="91440" tIns="45720" rIns="91440" bIns="45720" rtlCol="0"/>
+          <a:lstStyle>
+            <a:lvl1pPr algn="r">
+              <a:defRPr sz="1200"/>
+            </a:lvl1pPr>
+          </a:lstStyle>
+          <a:p>
+            <a:fld id="{F006E9B4-BA61-2A4C-BC78-D1E8B3DCAF2C}" type="datetimeFigureOut">
+              <a:rPr lang="en-US" smtClean="0"/>
+              <a:t>27/07/18</a:t>
+            </a:fld>
+            <a:endParaRPr lang="en-US"/>
+          </a:p>
+        </p:txBody>
+      </p:sp>
+      <p:sp>
+        <p:nvSpPr>
+          <p:cNvPr id="4" name="Slide Image Placeholder 3"/>
+          <p:cNvSpPr>
+            <a:spLocks noGrp="1" noRot="1" noChangeAspect="1"/>
+          </p:cNvSpPr>
+          <p:nvPr>
+            <p:ph type="sldImg" idx="2"/>
+          </p:nvPr>
+        </p:nvSpPr>
+        <p:spPr>
+          <a:xfrm>
+            <a:off x="571500" y="685800"/>
+            <a:ext cx="5715000" cy="3429000"/>
+          </a:xfrm>
+          <a:prstGeom prst="rect">
+            <a:avLst/>
+          </a:prstGeom>
+          <a:noFill/>
+          <a:ln w="12700">
+            <a:solidFill>
+              <a:prstClr val="black"/>
+            </a:solidFill>
+          </a:ln>
+        </p:spPr>
+        <p:txBody>
+          <a:bodyPr vert="horz" lIns="91440" tIns="45720" rIns="91440" bIns="45720" rtlCol="0" anchor="ctr"/>
+          <a:lstStyle/>
+          <a:p>
+            <a:endParaRPr lang="en-US"/>
+          </a:p>
+        </p:txBody>
+      </p:sp>
+      <p:sp>
+        <p:nvSpPr>
+          <p:cNvPr id="5" name="Notes Placeholder 4"/>
+          <p:cNvSpPr>
+            <a:spLocks noGrp="1"/>
+          </p:cNvSpPr>
+          <p:nvPr>
+            <p:ph type="body" sz="quarter" idx="3"/>
+          </p:nvPr>
+        </p:nvSpPr>
+        <p:spPr>
+          <a:xfrm>
+            <a:off x="685800" y="4343400"/>
+            <a:ext cx="5486400" cy="4114800"/>
+          </a:xfrm>
+          <a:prstGeom prst="rect">
+            <a:avLst/>
+          </a:prstGeom>
+        </p:spPr>
+        <p:txBody>
+          <a:bodyPr vert="horz" lIns="91440" tIns="45720" rIns="91440" bIns="45720" rtlCol="0"/>
+          <a:lstStyle/>
+          <a:p>
+            <a:pPr lvl="0"/>
+            <a:r>
+              <a:rPr lang="en-AU" smtClean="0"/>
+              <a:t>Click to edit Master text styles</a:t>
+            </a:r>
+          </a:p>
+          <a:p>
+            <a:pPr lvl="1"/>
+            <a:r>
+              <a:rPr lang="en-AU" smtClean="0"/>
+              <a:t>Second level</a:t>
+            </a:r>
+          </a:p>
+          <a:p>
+            <a:pPr lvl="2"/>
+            <a:r>
+              <a:rPr lang="en-AU" smtClean="0"/>
+              <a:t>Third level</a:t>
+            </a:r>
+          </a:p>
+          <a:p>
+            <a:pPr lvl="3"/>
+            <a:r>
+              <a:rPr lang="en-AU" smtClean="0"/>
+              <a:t>Fourth level</a:t>
+            </a:r>
+          </a:p>
+          <a:p>
+            <a:pPr lvl="4"/>
+            <a:r>
+              <a:rPr lang="en-AU" smtClean="0"/>
+              <a:t>Fifth level</a:t>
+            </a:r>
+            <a:endParaRPr lang="en-US"/>
+          </a:p>
+        </p:txBody>
+      </p:sp>
+      <p:sp>
+        <p:nvSpPr>
+          <p:cNvPr id="6" name="Footer Placeholder 5"/>
+          <p:cNvSpPr>
+            <a:spLocks noGrp="1"/>
+          </p:cNvSpPr>
+          <p:nvPr>
+            <p:ph type="ftr" sz="quarter" idx="4"/>
+          </p:nvPr>
+        </p:nvSpPr>
+        <p:spPr>
+          <a:xfrm>
+            <a:off x="0" y="8685213"/>
+            <a:ext cx="2971800" cy="457200"/>
+          </a:xfrm>
+          <a:prstGeom prst="rect">
+            <a:avLst/>
+          </a:prstGeom>
+        </p:spPr>
+        <p:txBody>
+          <a:bodyPr vert="horz" lIns="91440" tIns="45720" rIns="91440" bIns="45720" rtlCol="0" anchor="b"/>
+          <a:lstStyle>
+            <a:lvl1pPr algn="l">
+              <a:defRPr sz="1200"/>
+            </a:lvl1pPr>
+          </a:lstStyle>
+          <a:p>
+            <a:endParaRPr lang="en-US"/>
+          </a:p>
+        </p:txBody>
+      </p:sp>
+      <p:sp>
+        <p:nvSpPr>
+          <p:cNvPr id="7" name="Slide Number Placeholder 6"/>
+          <p:cNvSpPr>
+            <a:spLocks noGrp="1"/>
+          </p:cNvSpPr>
+          <p:nvPr>
+            <p:ph type="sldNum" sz="quarter" idx="5"/>
+          </p:nvPr>
+        </p:nvSpPr>
+        <p:spPr>
+          <a:xfrm>
+            <a:off x="3884613" y="8685213"/>
+            <a:ext cx="2971800" cy="457200"/>
+          </a:xfrm>
+          <a:prstGeom prst="rect">
+            <a:avLst/>
+          </a:prstGeom>
+        </p:spPr>
+        <p:txBody>
+          <a:bodyPr vert="horz" lIns="91440" tIns="45720" rIns="91440" bIns="45720" rtlCol="0" anchor="b"/>
+          <a:lstStyle>
+            <a:lvl1pPr algn="r">
+              <a:defRPr sz="1200"/>
+            </a:lvl1pPr>
+          </a:lstStyle>
+          <a:p>
+            <a:fld id="{00E5C777-6D2F-E647-AC6C-D87F8A9EEAB3}" type="slidenum">
+              <a:rPr lang="en-US" smtClean="0"/>
+              <a:t>‹#›</a:t>
+            </a:fld>
+            <a:endParaRPr lang="en-US"/>
+          </a:p>
+        </p:txBody>
+      </p:sp>
+    </p:spTree>
+    <p:extLst>
+      <p:ext uri="{BB962C8B-B14F-4D97-AF65-F5344CB8AC3E}">
+        <p14:creationId xmlns:p14="http://schemas.microsoft.com/office/powerpoint/2010/main" val="259563135"/>
+      </p:ext>
+    </p:extLst>
+  </p:cSld>
+  <p:clrMap bg1="lt1" tx1="dk1" bg2="lt2" tx2="dk2" accent1="accent1" accent2="accent2" accent3="accent3" accent4="accent4" accent5="accent5" accent6="accent6" hlink="hlink" folHlink="folHlink"/>
+  <p:notesStyle>
+    <a:lvl1pPr marL="0" algn="l" defTabSz="457200" rtl="0" eaLnBrk="1" latinLnBrk="0" hangingPunct="1">
+      <a:defRPr sz="1200" kern="1200">
+        <a:solidFill>
+          <a:schemeClr val="tx1"/>
+        </a:solidFill>
+        <a:latin typeface="+mn-lt"/>
+        <a:ea typeface="+mn-ea"/>
+        <a:cs typeface="+mn-cs"/>
+      </a:defRPr>
+    </a:lvl1pPr>
+    <a:lvl2pPr marL="457200" algn="l" defTabSz="457200" rtl="0" eaLnBrk="1" latinLnBrk="0" hangingPunct="1">
+      <a:defRPr sz="1200" kern="1200">
+        <a:solidFill>
+          <a:schemeClr val="tx1"/>
+        </a:solidFill>
+        <a:latin typeface="+mn-lt"/>
+        <a:ea typeface="+mn-ea"/>
+        <a:cs typeface="+mn-cs"/>
+      </a:defRPr>
+    </a:lvl2pPr>
+    <a:lvl3pPr marL="914400" algn="l" defTabSz="457200" rtl="0" eaLnBrk="1" latinLnBrk="0" hangingPunct="1">
+      <a:defRPr sz="1200" kern="1200">
+        <a:solidFill>
+          <a:schemeClr val="tx1"/>
+        </a:solidFill>
+        <a:latin typeface="+mn-lt"/>
+        <a:ea typeface="+mn-ea"/>
+        <a:cs typeface="+mn-cs"/>
+      </a:defRPr>
+    </a:lvl3pPr>
+    <a:lvl4pPr marL="1371600" algn="l" defTabSz="457200" rtl="0" eaLnBrk="1" latinLnBrk="0" hangingPunct="1">
+      <a:defRPr sz="1200" kern="1200">
+        <a:solidFill>
+          <a:schemeClr val="tx1"/>
+        </a:solidFill>
+        <a:latin typeface="+mn-lt"/>
+        <a:ea typeface="+mn-ea"/>
+        <a:cs typeface="+mn-cs"/>
+      </a:defRPr>
+    </a:lvl4pPr>
+    <a:lvl5pPr marL="1828800" algn="l" defTabSz="457200" rtl="0" eaLnBrk="1" latinLnBrk="0" hangingPunct="1">
+      <a:defRPr sz="1200" kern="1200">
+        <a:solidFill>
+          <a:schemeClr val="tx1"/>
+        </a:solidFill>
+        <a:latin typeface="+mn-lt"/>
+        <a:ea typeface="+mn-ea"/>
+        <a:cs typeface="+mn-cs"/>
+      </a:defRPr>
+    </a:lvl5pPr>
+    <a:lvl6pPr marL="2286000" algn="l" defTabSz="457200" rtl="0" eaLnBrk="1" latinLnBrk="0" hangingPunct="1">
+      <a:defRPr sz="1200" kern="1200">
+        <a:solidFill>
+          <a:schemeClr val="tx1"/>
+        </a:solidFill>
+        <a:latin typeface="+mn-lt"/>
+        <a:ea typeface="+mn-ea"/>
+        <a:cs typeface="+mn-cs"/>
+      </a:defRPr>
+    </a:lvl6pPr>
+    <a:lvl7pPr marL="2743200" algn="l" defTabSz="457200" rtl="0" eaLnBrk="1" latinLnBrk="0" hangingPunct="1">
+      <a:defRPr sz="1200" kern="1200">
+        <a:solidFill>
+          <a:schemeClr val="tx1"/>
+        </a:solidFill>
+        <a:latin typeface="+mn-lt"/>
+        <a:ea typeface="+mn-ea"/>
+        <a:cs typeface="+mn-cs"/>
+      </a:defRPr>
+    </a:lvl7pPr>
+    <a:lvl8pPr marL="3200400" algn="l" defTabSz="457200" rtl="0" eaLnBrk="1" latinLnBrk="0" hangingPunct="1">
+      <a:defRPr sz="1200" kern="1200">
+        <a:solidFill>
+          <a:schemeClr val="tx1"/>
+        </a:solidFill>
+        <a:latin typeface="+mn-lt"/>
+        <a:ea typeface="+mn-ea"/>
+        <a:cs typeface="+mn-cs"/>
+      </a:defRPr>
+    </a:lvl8pPr>
+    <a:lvl9pPr marL="3657600" algn="l" defTabSz="457200" rtl="0" eaLnBrk="1" latinLnBrk="0" hangingPunct="1">
+      <a:defRPr sz="1200" kern="1200">
+        <a:solidFill>
+          <a:schemeClr val="tx1"/>
+        </a:solidFill>
+        <a:latin typeface="+mn-lt"/>
+        <a:ea typeface="+mn-ea"/>
+        <a:cs typeface="+mn-cs"/>
+      </a:defRPr>
+    </a:lvl9pPr>
+  </p:notesStyle>
+</p:notesMaster>
+</file>
+
+<file path=ppt/notesSlides/notesSlide1.xml><?xml version="1.0" encoding="utf-8"?>
+<p:notes xmlns:a="http://schemas.openxmlformats.org/drawingml/2006/main" xmlns:r="http://schemas.openxmlformats.org/officeDocument/2006/relationships" xmlns:p="http://schemas.openxmlformats.org/presentationml/2006/main">
+  <p:cSld>
+    <p:spTree>
+      <p:nvGrpSpPr>
+        <p:cNvPr id="1" name=""/>
+        <p:cNvGrpSpPr/>
+        <p:nvPr/>
+      </p:nvGrpSpPr>
+      <p:grpSpPr>
+        <a:xfrm>
+          <a:off x="0" y="0"/>
+          <a:ext cx="0" cy="0"/>
+          <a:chOff x="0" y="0"/>
+          <a:chExt cx="0" cy="0"/>
+        </a:xfrm>
+      </p:grpSpPr>
+      <p:sp>
+        <p:nvSpPr>
+          <p:cNvPr id="2" name="Slide Image Placeholder 1"/>
+          <p:cNvSpPr>
+            <a:spLocks noGrp="1" noRot="1" noChangeAspect="1"/>
+          </p:cNvSpPr>
+          <p:nvPr>
+            <p:ph type="sldImg"/>
+          </p:nvPr>
+        </p:nvSpPr>
+        <p:spPr/>
+      </p:sp>
+      <p:sp>
+        <p:nvSpPr>
+          <p:cNvPr id="3" name="Notes Placeholder 2"/>
+          <p:cNvSpPr>
+            <a:spLocks noGrp="1"/>
+          </p:cNvSpPr>
+          <p:nvPr>
+            <p:ph type="body" idx="1"/>
+          </p:nvPr>
+        </p:nvSpPr>
+        <p:spPr/>
+        <p:txBody>
+          <a:bodyPr/>
+          <a:lstStyle/>
+          <a:p>
+            <a:r>
+              <a:rPr lang="en-US" dirty="0" smtClean="0"/>
+              <a:t>storyline</a:t>
+            </a:r>
+          </a:p>
+          <a:p>
+            <a:r>
+              <a:rPr lang="en-US" dirty="0" err="1" smtClean="0"/>
+              <a:t>dr</a:t>
+            </a:r>
+            <a:r>
+              <a:rPr lang="en-US" dirty="0" smtClean="0"/>
+              <a:t> </a:t>
+            </a:r>
+            <a:r>
+              <a:rPr lang="en-US" dirty="0" err="1" smtClean="0"/>
+              <a:t>darwin</a:t>
+            </a:r>
+            <a:endParaRPr lang="en-US" dirty="0" smtClean="0"/>
+          </a:p>
+          <a:p>
+            <a:endParaRPr lang="en-US" dirty="0" smtClean="0"/>
+          </a:p>
+          <a:p>
+            <a:r>
+              <a:rPr lang="en-US" dirty="0" smtClean="0"/>
+              <a:t>the creatures </a:t>
+            </a:r>
+          </a:p>
+          <a:p>
+            <a:r>
+              <a:rPr lang="en-US" dirty="0" smtClean="0"/>
+              <a:t>how they evolve</a:t>
+            </a:r>
+          </a:p>
+          <a:p>
+            <a:endParaRPr lang="en-US" dirty="0" smtClean="0"/>
+          </a:p>
+          <a:p>
+            <a:r>
+              <a:rPr lang="en-US" dirty="0" smtClean="0"/>
+              <a:t>use</a:t>
+            </a:r>
+            <a:r>
+              <a:rPr lang="en-US" baseline="0" dirty="0" smtClean="0"/>
+              <a:t> arrow keys to move and spacebar to shoot</a:t>
+            </a:r>
+          </a:p>
+          <a:p>
+            <a:r>
+              <a:rPr lang="en-US" baseline="0" dirty="0" smtClean="0"/>
+              <a:t>shooting decreases your health</a:t>
+            </a:r>
+          </a:p>
+          <a:p>
+            <a:r>
+              <a:rPr lang="en-US" baseline="0" dirty="0" smtClean="0"/>
+              <a:t>going into the wall decreases your health</a:t>
+            </a:r>
+          </a:p>
+          <a:p>
+            <a:r>
+              <a:rPr lang="en-US" baseline="0" dirty="0" smtClean="0"/>
+              <a:t>the creatures eating you decreases your health</a:t>
+            </a:r>
+          </a:p>
+          <a:p>
+            <a:endParaRPr lang="en-US" dirty="0" smtClean="0"/>
+          </a:p>
+        </p:txBody>
+      </p:sp>
+      <p:sp>
+        <p:nvSpPr>
+          <p:cNvPr id="4" name="Slide Number Placeholder 3"/>
+          <p:cNvSpPr>
+            <a:spLocks noGrp="1"/>
+          </p:cNvSpPr>
+          <p:nvPr>
+            <p:ph type="sldNum" sz="quarter" idx="10"/>
+          </p:nvPr>
+        </p:nvSpPr>
+        <p:spPr/>
+        <p:txBody>
+          <a:bodyPr/>
+          <a:lstStyle/>
+          <a:p>
+            <a:fld id="{00E5C777-6D2F-E647-AC6C-D87F8A9EEAB3}" type="slidenum">
+              <a:rPr lang="en-US" smtClean="0"/>
+              <a:t>1</a:t>
+            </a:fld>
+            <a:endParaRPr lang="en-US"/>
+          </a:p>
+        </p:txBody>
+      </p:sp>
+    </p:spTree>
+    <p:extLst>
+      <p:ext uri="{BB962C8B-B14F-4D97-AF65-F5344CB8AC3E}">
+        <p14:creationId xmlns:p14="http://schemas.microsoft.com/office/powerpoint/2010/main" val="3631467729"/>
+      </p:ext>
+    </p:extLst>
+  </p:cSld>
+  <p:clrMapOvr>
+    <a:masterClrMapping/>
+  </p:clrMapOvr>
+</p:notes>
+</file>
+
 <file path=ppt/slideLayouts/slideLayout1.xml><?xml version="1.0" encoding="utf-8"?>
 <p:sldLayout xmlns:a="http://schemas.openxmlformats.org/drawingml/2006/main" xmlns:r="http://schemas.openxmlformats.org/officeDocument/2006/relationships" xmlns:p="http://schemas.openxmlformats.org/presentationml/2006/main" type="title" preserve="1">
   <p:cSld name="Title Slide">
@@ -289,7 +795,7 @@
           <a:p>
             <a:fld id="{A75C9821-D6E9-674A-904E-2F9D6E55AA59}" type="datetimeFigureOut">
               <a:rPr lang="en-US" smtClean="0"/>
-              <a:t>23/07/18</a:t>
+              <a:t>26/07/18</a:t>
             </a:fld>
             <a:endParaRPr lang="en-US"/>
           </a:p>
@@ -340,7 +846,7 @@
     </p:spTree>
     <p:extLst>
       <p:ext uri="{BB962C8B-B14F-4D97-AF65-F5344CB8AC3E}">
-        <p14:creationId xmlns:p14="http://schemas.microsoft.com/office/powerpoint/2010/main" val="2702019936"/>
+        <p14:creationId xmlns:p14="http://schemas.microsoft.com/office/powerpoint/2010/main" val="4001463933"/>
       </p:ext>
     </p:extLst>
   </p:cSld>
@@ -459,7 +965,7 @@
           <a:p>
             <a:fld id="{A75C9821-D6E9-674A-904E-2F9D6E55AA59}" type="datetimeFigureOut">
               <a:rPr lang="en-US" smtClean="0"/>
-              <a:t>23/07/18</a:t>
+              <a:t>26/07/18</a:t>
             </a:fld>
             <a:endParaRPr lang="en-US"/>
           </a:p>
@@ -510,7 +1016,7 @@
     </p:spTree>
     <p:extLst>
       <p:ext uri="{BB962C8B-B14F-4D97-AF65-F5344CB8AC3E}">
-        <p14:creationId xmlns:p14="http://schemas.microsoft.com/office/powerpoint/2010/main" val="2949498235"/>
+        <p14:creationId xmlns:p14="http://schemas.microsoft.com/office/powerpoint/2010/main" val="4062160604"/>
       </p:ext>
     </p:extLst>
   </p:cSld>
@@ -639,7 +1145,7 @@
           <a:p>
             <a:fld id="{A75C9821-D6E9-674A-904E-2F9D6E55AA59}" type="datetimeFigureOut">
               <a:rPr lang="en-US" smtClean="0"/>
-              <a:t>23/07/18</a:t>
+              <a:t>26/07/18</a:t>
             </a:fld>
             <a:endParaRPr lang="en-US"/>
           </a:p>
@@ -690,7 +1196,7 @@
     </p:spTree>
     <p:extLst>
       <p:ext uri="{BB962C8B-B14F-4D97-AF65-F5344CB8AC3E}">
-        <p14:creationId xmlns:p14="http://schemas.microsoft.com/office/powerpoint/2010/main" val="1427941222"/>
+        <p14:creationId xmlns:p14="http://schemas.microsoft.com/office/powerpoint/2010/main" val="841344989"/>
       </p:ext>
     </p:extLst>
   </p:cSld>
@@ -809,7 +1315,7 @@
           <a:p>
             <a:fld id="{A75C9821-D6E9-674A-904E-2F9D6E55AA59}" type="datetimeFigureOut">
               <a:rPr lang="en-US" smtClean="0"/>
-              <a:t>23/07/18</a:t>
+              <a:t>26/07/18</a:t>
             </a:fld>
             <a:endParaRPr lang="en-US"/>
           </a:p>
@@ -860,7 +1366,7 @@
     </p:spTree>
     <p:extLst>
       <p:ext uri="{BB962C8B-B14F-4D97-AF65-F5344CB8AC3E}">
-        <p14:creationId xmlns:p14="http://schemas.microsoft.com/office/powerpoint/2010/main" val="2275933374"/>
+        <p14:creationId xmlns:p14="http://schemas.microsoft.com/office/powerpoint/2010/main" val="3705768460"/>
       </p:ext>
     </p:extLst>
   </p:cSld>
@@ -1055,7 +1561,7 @@
           <a:p>
             <a:fld id="{A75C9821-D6E9-674A-904E-2F9D6E55AA59}" type="datetimeFigureOut">
               <a:rPr lang="en-US" smtClean="0"/>
-              <a:t>23/07/18</a:t>
+              <a:t>26/07/18</a:t>
             </a:fld>
             <a:endParaRPr lang="en-US"/>
           </a:p>
@@ -1106,7 +1612,7 @@
     </p:spTree>
     <p:extLst>
       <p:ext uri="{BB962C8B-B14F-4D97-AF65-F5344CB8AC3E}">
-        <p14:creationId xmlns:p14="http://schemas.microsoft.com/office/powerpoint/2010/main" val="1798952600"/>
+        <p14:creationId xmlns:p14="http://schemas.microsoft.com/office/powerpoint/2010/main" val="1350098706"/>
       </p:ext>
     </p:extLst>
   </p:cSld>
@@ -1343,7 +1849,7 @@
           <a:p>
             <a:fld id="{A75C9821-D6E9-674A-904E-2F9D6E55AA59}" type="datetimeFigureOut">
               <a:rPr lang="en-US" smtClean="0"/>
-              <a:t>23/07/18</a:t>
+              <a:t>26/07/18</a:t>
             </a:fld>
             <a:endParaRPr lang="en-US"/>
           </a:p>
@@ -1394,7 +1900,7 @@
     </p:spTree>
     <p:extLst>
       <p:ext uri="{BB962C8B-B14F-4D97-AF65-F5344CB8AC3E}">
-        <p14:creationId xmlns:p14="http://schemas.microsoft.com/office/powerpoint/2010/main" val="1034301619"/>
+        <p14:creationId xmlns:p14="http://schemas.microsoft.com/office/powerpoint/2010/main" val="337547128"/>
       </p:ext>
     </p:extLst>
   </p:cSld>
@@ -1765,7 +2271,7 @@
           <a:p>
             <a:fld id="{A75C9821-D6E9-674A-904E-2F9D6E55AA59}" type="datetimeFigureOut">
               <a:rPr lang="en-US" smtClean="0"/>
-              <a:t>23/07/18</a:t>
+              <a:t>26/07/18</a:t>
             </a:fld>
             <a:endParaRPr lang="en-US"/>
           </a:p>
@@ -1816,7 +2322,7 @@
     </p:spTree>
     <p:extLst>
       <p:ext uri="{BB962C8B-B14F-4D97-AF65-F5344CB8AC3E}">
-        <p14:creationId xmlns:p14="http://schemas.microsoft.com/office/powerpoint/2010/main" val="1417940929"/>
+        <p14:creationId xmlns:p14="http://schemas.microsoft.com/office/powerpoint/2010/main" val="1292038217"/>
       </p:ext>
     </p:extLst>
   </p:cSld>
@@ -1883,7 +2389,7 @@
           <a:p>
             <a:fld id="{A75C9821-D6E9-674A-904E-2F9D6E55AA59}" type="datetimeFigureOut">
               <a:rPr lang="en-US" smtClean="0"/>
-              <a:t>23/07/18</a:t>
+              <a:t>26/07/18</a:t>
             </a:fld>
             <a:endParaRPr lang="en-US"/>
           </a:p>
@@ -1934,7 +2440,7 @@
     </p:spTree>
     <p:extLst>
       <p:ext uri="{BB962C8B-B14F-4D97-AF65-F5344CB8AC3E}">
-        <p14:creationId xmlns:p14="http://schemas.microsoft.com/office/powerpoint/2010/main" val="656067729"/>
+        <p14:creationId xmlns:p14="http://schemas.microsoft.com/office/powerpoint/2010/main" val="999793255"/>
       </p:ext>
     </p:extLst>
   </p:cSld>
@@ -1978,7 +2484,7 @@
           <a:p>
             <a:fld id="{A75C9821-D6E9-674A-904E-2F9D6E55AA59}" type="datetimeFigureOut">
               <a:rPr lang="en-US" smtClean="0"/>
-              <a:t>23/07/18</a:t>
+              <a:t>26/07/18</a:t>
             </a:fld>
             <a:endParaRPr lang="en-US"/>
           </a:p>
@@ -2029,7 +2535,7 @@
     </p:spTree>
     <p:extLst>
       <p:ext uri="{BB962C8B-B14F-4D97-AF65-F5344CB8AC3E}">
-        <p14:creationId xmlns:p14="http://schemas.microsoft.com/office/powerpoint/2010/main" val="1249128790"/>
+        <p14:creationId xmlns:p14="http://schemas.microsoft.com/office/powerpoint/2010/main" val="2622201402"/>
       </p:ext>
     </p:extLst>
   </p:cSld>
@@ -2255,7 +2761,7 @@
           <a:p>
             <a:fld id="{A75C9821-D6E9-674A-904E-2F9D6E55AA59}" type="datetimeFigureOut">
               <a:rPr lang="en-US" smtClean="0"/>
-              <a:t>23/07/18</a:t>
+              <a:t>26/07/18</a:t>
             </a:fld>
             <a:endParaRPr lang="en-US"/>
           </a:p>
@@ -2306,7 +2812,7 @@
     </p:spTree>
     <p:extLst>
       <p:ext uri="{BB962C8B-B14F-4D97-AF65-F5344CB8AC3E}">
-        <p14:creationId xmlns:p14="http://schemas.microsoft.com/office/powerpoint/2010/main" val="2730116199"/>
+        <p14:creationId xmlns:p14="http://schemas.microsoft.com/office/powerpoint/2010/main" val="1089981929"/>
       </p:ext>
     </p:extLst>
   </p:cSld>
@@ -2422,10 +2928,6 @@
             </a:lvl9pPr>
           </a:lstStyle>
           <a:p>
-            <a:r>
-              <a:rPr lang="en-AU" smtClean="0"/>
-              <a:t>Drag picture to placeholder or click icon to add</a:t>
-            </a:r>
             <a:endParaRPr lang="en-US"/>
           </a:p>
         </p:txBody>
@@ -2512,7 +3014,7 @@
           <a:p>
             <a:fld id="{A75C9821-D6E9-674A-904E-2F9D6E55AA59}" type="datetimeFigureOut">
               <a:rPr lang="en-US" smtClean="0"/>
-              <a:t>23/07/18</a:t>
+              <a:t>26/07/18</a:t>
             </a:fld>
             <a:endParaRPr lang="en-US"/>
           </a:p>
@@ -2563,7 +3065,7 @@
     </p:spTree>
     <p:extLst>
       <p:ext uri="{BB962C8B-B14F-4D97-AF65-F5344CB8AC3E}">
-        <p14:creationId xmlns:p14="http://schemas.microsoft.com/office/powerpoint/2010/main" val="506574558"/>
+        <p14:creationId xmlns:p14="http://schemas.microsoft.com/office/powerpoint/2010/main" val="892835216"/>
       </p:ext>
     </p:extLst>
   </p:cSld>
@@ -2725,7 +3227,7 @@
           <a:p>
             <a:fld id="{A75C9821-D6E9-674A-904E-2F9D6E55AA59}" type="datetimeFigureOut">
               <a:rPr lang="en-US" smtClean="0"/>
-              <a:t>23/07/18</a:t>
+              <a:t>26/07/18</a:t>
             </a:fld>
             <a:endParaRPr lang="en-US"/>
           </a:p>
@@ -2812,27 +3314,27 @@
     </p:spTree>
     <p:extLst>
       <p:ext uri="{BB962C8B-B14F-4D97-AF65-F5344CB8AC3E}">
-        <p14:creationId xmlns:p14="http://schemas.microsoft.com/office/powerpoint/2010/main" val="2557711237"/>
+        <p14:creationId xmlns:p14="http://schemas.microsoft.com/office/powerpoint/2010/main" val="2527622251"/>
       </p:ext>
     </p:extLst>
   </p:cSld>
-  <p:clrMap bg1="dk1" tx1="lt1" bg2="dk2" tx2="lt2" accent1="accent1" accent2="accent2" accent3="accent3" accent4="accent4" accent5="accent5" accent6="accent6" hlink="hlink" folHlink="folHlink"/>
+  <p:clrMap bg1="lt1" tx1="dk1" bg2="lt2" tx2="dk2" accent1="accent1" accent2="accent2" accent3="accent3" accent4="accent4" accent5="accent5" accent6="accent6" hlink="hlink" folHlink="folHlink"/>
   <p:sldLayoutIdLst>
-    <p:sldLayoutId id="2147483661" r:id="rId1"/>
-    <p:sldLayoutId id="2147483662" r:id="rId2"/>
-    <p:sldLayoutId id="2147483663" r:id="rId3"/>
-    <p:sldLayoutId id="2147483664" r:id="rId4"/>
-    <p:sldLayoutId id="2147483665" r:id="rId5"/>
-    <p:sldLayoutId id="2147483666" r:id="rId6"/>
-    <p:sldLayoutId id="2147483667" r:id="rId7"/>
-    <p:sldLayoutId id="2147483668" r:id="rId8"/>
-    <p:sldLayoutId id="2147483669" r:id="rId9"/>
-    <p:sldLayoutId id="2147483670" r:id="rId10"/>
-    <p:sldLayoutId id="2147483671" r:id="rId11"/>
+    <p:sldLayoutId id="2147483673" r:id="rId1"/>
+    <p:sldLayoutId id="2147483674" r:id="rId2"/>
+    <p:sldLayoutId id="2147483675" r:id="rId3"/>
+    <p:sldLayoutId id="2147483676" r:id="rId4"/>
+    <p:sldLayoutId id="2147483677" r:id="rId5"/>
+    <p:sldLayoutId id="2147483678" r:id="rId6"/>
+    <p:sldLayoutId id="2147483679" r:id="rId7"/>
+    <p:sldLayoutId id="2147483680" r:id="rId8"/>
+    <p:sldLayoutId id="2147483681" r:id="rId9"/>
+    <p:sldLayoutId id="2147483682" r:id="rId10"/>
+    <p:sldLayoutId id="2147483683" r:id="rId11"/>
   </p:sldLayoutIdLst>
   <p:txStyles>
     <p:titleStyle>
-      <a:lvl1pPr algn="ctr" defTabSz="914400" rtl="0" eaLnBrk="1" latinLnBrk="0" hangingPunct="1">
+      <a:lvl1pPr algn="ctr" defTabSz="457200" rtl="0" eaLnBrk="1" latinLnBrk="0" hangingPunct="1">
         <a:spcBef>
           <a:spcPct val="0"/>
         </a:spcBef>
@@ -2848,11 +3350,11 @@
       </a:lvl1pPr>
     </p:titleStyle>
     <p:bodyStyle>
-      <a:lvl1pPr marL="342900" indent="-342900" algn="l" defTabSz="914400" rtl="0" eaLnBrk="1" latinLnBrk="0" hangingPunct="1">
+      <a:lvl1pPr marL="342900" indent="-342900" algn="l" defTabSz="457200" rtl="0" eaLnBrk="1" latinLnBrk="0" hangingPunct="1">
         <a:spcBef>
           <a:spcPct val="20000"/>
         </a:spcBef>
-        <a:buFont typeface="Arial" pitchFamily="34" charset="0"/>
+        <a:buFont typeface="Arial"/>
         <a:buChar char="•"/>
         <a:defRPr sz="3200" kern="1200">
           <a:solidFill>
@@ -2863,11 +3365,11 @@
           <a:cs typeface="+mn-cs"/>
         </a:defRPr>
       </a:lvl1pPr>
-      <a:lvl2pPr marL="742950" indent="-285750" algn="l" defTabSz="914400" rtl="0" eaLnBrk="1" latinLnBrk="0" hangingPunct="1">
+      <a:lvl2pPr marL="742950" indent="-285750" algn="l" defTabSz="457200" rtl="0" eaLnBrk="1" latinLnBrk="0" hangingPunct="1">
         <a:spcBef>
           <a:spcPct val="20000"/>
         </a:spcBef>
-        <a:buFont typeface="Arial" pitchFamily="34" charset="0"/>
+        <a:buFont typeface="Arial"/>
         <a:buChar char="–"/>
         <a:defRPr sz="2800" kern="1200">
           <a:solidFill>
@@ -2878,11 +3380,11 @@
           <a:cs typeface="+mn-cs"/>
         </a:defRPr>
       </a:lvl2pPr>
-      <a:lvl3pPr marL="1143000" indent="-228600" algn="l" defTabSz="914400" rtl="0" eaLnBrk="1" latinLnBrk="0" hangingPunct="1">
+      <a:lvl3pPr marL="1143000" indent="-228600" algn="l" defTabSz="457200" rtl="0" eaLnBrk="1" latinLnBrk="0" hangingPunct="1">
         <a:spcBef>
           <a:spcPct val="20000"/>
         </a:spcBef>
-        <a:buFont typeface="Arial" pitchFamily="34" charset="0"/>
+        <a:buFont typeface="Arial"/>
         <a:buChar char="•"/>
         <a:defRPr sz="2400" kern="1200">
           <a:solidFill>
@@ -2893,11 +3395,11 @@
           <a:cs typeface="+mn-cs"/>
         </a:defRPr>
       </a:lvl3pPr>
-      <a:lvl4pPr marL="1600200" indent="-228600" algn="l" defTabSz="914400" rtl="0" eaLnBrk="1" latinLnBrk="0" hangingPunct="1">
+      <a:lvl4pPr marL="1600200" indent="-228600" algn="l" defTabSz="457200" rtl="0" eaLnBrk="1" latinLnBrk="0" hangingPunct="1">
         <a:spcBef>
           <a:spcPct val="20000"/>
         </a:spcBef>
-        <a:buFont typeface="Arial" pitchFamily="34" charset="0"/>
+        <a:buFont typeface="Arial"/>
         <a:buChar char="–"/>
         <a:defRPr sz="2000" kern="1200">
           <a:solidFill>
@@ -2908,11 +3410,11 @@
           <a:cs typeface="+mn-cs"/>
         </a:defRPr>
       </a:lvl4pPr>
-      <a:lvl5pPr marL="2057400" indent="-228600" algn="l" defTabSz="914400" rtl="0" eaLnBrk="1" latinLnBrk="0" hangingPunct="1">
+      <a:lvl5pPr marL="2057400" indent="-228600" algn="l" defTabSz="457200" rtl="0" eaLnBrk="1" latinLnBrk="0" hangingPunct="1">
         <a:spcBef>
           <a:spcPct val="20000"/>
         </a:spcBef>
-        <a:buFont typeface="Arial" pitchFamily="34" charset="0"/>
+        <a:buFont typeface="Arial"/>
         <a:buChar char="»"/>
         <a:defRPr sz="2000" kern="1200">
           <a:solidFill>
@@ -2923,11 +3425,11 @@
           <a:cs typeface="+mn-cs"/>
         </a:defRPr>
       </a:lvl5pPr>
-      <a:lvl6pPr marL="2514600" indent="-228600" algn="l" defTabSz="914400" rtl="0" eaLnBrk="1" latinLnBrk="0" hangingPunct="1">
+      <a:lvl6pPr marL="2514600" indent="-228600" algn="l" defTabSz="457200" rtl="0" eaLnBrk="1" latinLnBrk="0" hangingPunct="1">
         <a:spcBef>
           <a:spcPct val="20000"/>
         </a:spcBef>
-        <a:buFont typeface="Arial" pitchFamily="34" charset="0"/>
+        <a:buFont typeface="Arial"/>
         <a:buChar char="•"/>
         <a:defRPr sz="2000" kern="1200">
           <a:solidFill>
@@ -2938,11 +3440,11 @@
           <a:cs typeface="+mn-cs"/>
         </a:defRPr>
       </a:lvl6pPr>
-      <a:lvl7pPr marL="2971800" indent="-228600" algn="l" defTabSz="914400" rtl="0" eaLnBrk="1" latinLnBrk="0" hangingPunct="1">
+      <a:lvl7pPr marL="2971800" indent="-228600" algn="l" defTabSz="457200" rtl="0" eaLnBrk="1" latinLnBrk="0" hangingPunct="1">
         <a:spcBef>
           <a:spcPct val="20000"/>
         </a:spcBef>
-        <a:buFont typeface="Arial" pitchFamily="34" charset="0"/>
+        <a:buFont typeface="Arial"/>
         <a:buChar char="•"/>
         <a:defRPr sz="2000" kern="1200">
           <a:solidFill>
@@ -2953,11 +3455,11 @@
           <a:cs typeface="+mn-cs"/>
         </a:defRPr>
       </a:lvl7pPr>
-      <a:lvl8pPr marL="3429000" indent="-228600" algn="l" defTabSz="914400" rtl="0" eaLnBrk="1" latinLnBrk="0" hangingPunct="1">
+      <a:lvl8pPr marL="3429000" indent="-228600" algn="l" defTabSz="457200" rtl="0" eaLnBrk="1" latinLnBrk="0" hangingPunct="1">
         <a:spcBef>
           <a:spcPct val="20000"/>
         </a:spcBef>
-        <a:buFont typeface="Arial" pitchFamily="34" charset="0"/>
+        <a:buFont typeface="Arial"/>
         <a:buChar char="•"/>
         <a:defRPr sz="2000" kern="1200">
           <a:solidFill>
@@ -2968,11 +3470,11 @@
           <a:cs typeface="+mn-cs"/>
         </a:defRPr>
       </a:lvl8pPr>
-      <a:lvl9pPr marL="3886200" indent="-228600" algn="l" defTabSz="914400" rtl="0" eaLnBrk="1" latinLnBrk="0" hangingPunct="1">
+      <a:lvl9pPr marL="3886200" indent="-228600" algn="l" defTabSz="457200" rtl="0" eaLnBrk="1" latinLnBrk="0" hangingPunct="1">
         <a:spcBef>
           <a:spcPct val="20000"/>
         </a:spcBef>
-        <a:buFont typeface="Arial" pitchFamily="34" charset="0"/>
+        <a:buFont typeface="Arial"/>
         <a:buChar char="•"/>
         <a:defRPr sz="2000" kern="1200">
           <a:solidFill>
@@ -2988,7 +3490,7 @@
       <a:defPPr>
         <a:defRPr lang="en-US"/>
       </a:defPPr>
-      <a:lvl1pPr marL="0" algn="l" defTabSz="914400" rtl="0" eaLnBrk="1" latinLnBrk="0" hangingPunct="1">
+      <a:lvl1pPr marL="0" algn="l" defTabSz="457200" rtl="0" eaLnBrk="1" latinLnBrk="0" hangingPunct="1">
         <a:defRPr sz="1800" kern="1200">
           <a:solidFill>
             <a:schemeClr val="tx1"/>
@@ -2998,7 +3500,7 @@
           <a:cs typeface="+mn-cs"/>
         </a:defRPr>
       </a:lvl1pPr>
-      <a:lvl2pPr marL="457200" algn="l" defTabSz="914400" rtl="0" eaLnBrk="1" latinLnBrk="0" hangingPunct="1">
+      <a:lvl2pPr marL="457200" algn="l" defTabSz="457200" rtl="0" eaLnBrk="1" latinLnBrk="0" hangingPunct="1">
         <a:defRPr sz="1800" kern="1200">
           <a:solidFill>
             <a:schemeClr val="tx1"/>
@@ -3008,7 +3510,7 @@
           <a:cs typeface="+mn-cs"/>
         </a:defRPr>
       </a:lvl2pPr>
-      <a:lvl3pPr marL="914400" algn="l" defTabSz="914400" rtl="0" eaLnBrk="1" latinLnBrk="0" hangingPunct="1">
+      <a:lvl3pPr marL="914400" algn="l" defTabSz="457200" rtl="0" eaLnBrk="1" latinLnBrk="0" hangingPunct="1">
         <a:defRPr sz="1800" kern="1200">
           <a:solidFill>
             <a:schemeClr val="tx1"/>
@@ -3018,7 +3520,7 @@
           <a:cs typeface="+mn-cs"/>
         </a:defRPr>
       </a:lvl3pPr>
-      <a:lvl4pPr marL="1371600" algn="l" defTabSz="914400" rtl="0" eaLnBrk="1" latinLnBrk="0" hangingPunct="1">
+      <a:lvl4pPr marL="1371600" algn="l" defTabSz="457200" rtl="0" eaLnBrk="1" latinLnBrk="0" hangingPunct="1">
         <a:defRPr sz="1800" kern="1200">
           <a:solidFill>
             <a:schemeClr val="tx1"/>
@@ -3028,7 +3530,7 @@
           <a:cs typeface="+mn-cs"/>
         </a:defRPr>
       </a:lvl4pPr>
-      <a:lvl5pPr marL="1828800" algn="l" defTabSz="914400" rtl="0" eaLnBrk="1" latinLnBrk="0" hangingPunct="1">
+      <a:lvl5pPr marL="1828800" algn="l" defTabSz="457200" rtl="0" eaLnBrk="1" latinLnBrk="0" hangingPunct="1">
         <a:defRPr sz="1800" kern="1200">
           <a:solidFill>
             <a:schemeClr val="tx1"/>
@@ -3038,7 +3540,7 @@
           <a:cs typeface="+mn-cs"/>
         </a:defRPr>
       </a:lvl5pPr>
-      <a:lvl6pPr marL="2286000" algn="l" defTabSz="914400" rtl="0" eaLnBrk="1" latinLnBrk="0" hangingPunct="1">
+      <a:lvl6pPr marL="2286000" algn="l" defTabSz="457200" rtl="0" eaLnBrk="1" latinLnBrk="0" hangingPunct="1">
         <a:defRPr sz="1800" kern="1200">
           <a:solidFill>
             <a:schemeClr val="tx1"/>
@@ -3048,7 +3550,7 @@
           <a:cs typeface="+mn-cs"/>
         </a:defRPr>
       </a:lvl6pPr>
-      <a:lvl7pPr marL="2743200" algn="l" defTabSz="914400" rtl="0" eaLnBrk="1" latinLnBrk="0" hangingPunct="1">
+      <a:lvl7pPr marL="2743200" algn="l" defTabSz="457200" rtl="0" eaLnBrk="1" latinLnBrk="0" hangingPunct="1">
         <a:defRPr sz="1800" kern="1200">
           <a:solidFill>
             <a:schemeClr val="tx1"/>
@@ -3058,7 +3560,7 @@
           <a:cs typeface="+mn-cs"/>
         </a:defRPr>
       </a:lvl7pPr>
-      <a:lvl8pPr marL="3200400" algn="l" defTabSz="914400" rtl="0" eaLnBrk="1" latinLnBrk="0" hangingPunct="1">
+      <a:lvl8pPr marL="3200400" algn="l" defTabSz="457200" rtl="0" eaLnBrk="1" latinLnBrk="0" hangingPunct="1">
         <a:defRPr sz="1800" kern="1200">
           <a:solidFill>
             <a:schemeClr val="tx1"/>
@@ -3068,7 +3570,7 @@
           <a:cs typeface="+mn-cs"/>
         </a:defRPr>
       </a:lvl8pPr>
-      <a:lvl9pPr marL="3657600" algn="l" defTabSz="914400" rtl="0" eaLnBrk="1" latinLnBrk="0" hangingPunct="1">
+      <a:lvl9pPr marL="3657600" algn="l" defTabSz="457200" rtl="0" eaLnBrk="1" latinLnBrk="0" hangingPunct="1">
         <a:defRPr sz="1800" kern="1200">
           <a:solidFill>
             <a:schemeClr val="tx1"/>
@@ -3102,14 +3604,59 @@
       </p:grpSpPr>
       <p:sp>
         <p:nvSpPr>
+          <p:cNvPr id="3" name="Rectangle 2"/>
+          <p:cNvSpPr/>
+          <p:nvPr/>
+        </p:nvSpPr>
+        <p:spPr>
+          <a:xfrm>
+            <a:off x="-1" y="0"/>
+            <a:ext cx="9528175" cy="5715000"/>
+          </a:xfrm>
+          <a:prstGeom prst="rect">
+            <a:avLst/>
+          </a:prstGeom>
+          <a:solidFill>
+            <a:srgbClr val="000000"/>
+          </a:solidFill>
+          <a:ln>
+            <a:noFill/>
+          </a:ln>
+          <a:effectLst/>
+        </p:spPr>
+        <p:style>
+          <a:lnRef idx="1">
+            <a:schemeClr val="accent1"/>
+          </a:lnRef>
+          <a:fillRef idx="3">
+            <a:schemeClr val="accent1"/>
+          </a:fillRef>
+          <a:effectRef idx="2">
+            <a:schemeClr val="accent1"/>
+          </a:effectRef>
+          <a:fontRef idx="minor">
+            <a:schemeClr val="lt1"/>
+          </a:fontRef>
+        </p:style>
+        <p:txBody>
+          <a:bodyPr rtlCol="0" anchor="ctr"/>
+          <a:lstStyle/>
+          <a:p>
+            <a:pPr algn="ctr"/>
+            <a:endParaRPr lang="en-US"/>
+          </a:p>
+        </p:txBody>
+      </p:sp>
+      <p:sp>
+        <p:nvSpPr>
           <p:cNvPr id="11" name="TextBox 10"/>
           <p:cNvSpPr txBox="1"/>
           <p:nvPr/>
         </p:nvSpPr>
         <p:spPr>
           <a:xfrm>
-            <a:off x="1527371" y="1161623"/>
-            <a:ext cx="5874033" cy="584776"/>
+            <a:off x="647485" y="1184451"/>
+            <a:ext cx="7007929" cy="307777"/>
           </a:xfrm>
           <a:prstGeom prst="rect">
             <a:avLst/>
@@ -3143,6 +3690,853 @@
               <a:defRPr/>
             </a:pPr>
             <a:r>
+              <a:rPr kumimoji="0" lang="en-US" sz="1400" b="0" i="0" u="none" strike="noStrike" kern="0" cap="none" spc="0" normalizeH="0" baseline="0" noProof="0" dirty="0" smtClean="0">
+                <a:ln>
+                  <a:noFill/>
+                </a:ln>
+                <a:solidFill>
+                  <a:sysClr val="window" lastClr="FFFFFF"/>
+                </a:solidFill>
+                <a:effectLst/>
+                <a:uLnTx/>
+                <a:uFillTx/>
+                <a:latin typeface="Consolas"/>
+                <a:cs typeface="Consolas"/>
+              </a:rPr>
+              <a:t>Evil </a:t>
+            </a:r>
+            <a:r>
+              <a:rPr kumimoji="0" lang="en-US" sz="1400" b="0" i="0" u="none" strike="noStrike" kern="0" cap="none" spc="0" normalizeH="0" baseline="0" noProof="0" dirty="0" smtClean="0">
+                <a:ln>
+                  <a:noFill/>
+                </a:ln>
+                <a:solidFill>
+                  <a:sysClr val="window" lastClr="FFFFFF"/>
+                </a:solidFill>
+                <a:effectLst/>
+                <a:uLnTx/>
+                <a:uFillTx/>
+                <a:latin typeface="Consolas"/>
+                <a:cs typeface="Consolas"/>
+              </a:rPr>
+              <a:t>Dr. </a:t>
+            </a:r>
+            <a:r>
+              <a:rPr kumimoji="0" lang="en-US" sz="1400" b="0" i="0" u="none" strike="noStrike" kern="0" cap="none" spc="0" normalizeH="0" baseline="0" noProof="0" dirty="0" smtClean="0">
+                <a:ln>
+                  <a:noFill/>
+                </a:ln>
+                <a:solidFill>
+                  <a:sysClr val="window" lastClr="FFFFFF"/>
+                </a:solidFill>
+                <a:effectLst/>
+                <a:uLnTx/>
+                <a:uFillTx/>
+                <a:latin typeface="Consolas"/>
+                <a:cs typeface="Consolas"/>
+              </a:rPr>
+              <a:t>Darwin is planning to </a:t>
+            </a:r>
+            <a:r>
+              <a:rPr kumimoji="0" lang="en-US" sz="1400" b="0" i="0" u="none" strike="noStrike" kern="0" cap="none" spc="0" normalizeH="0" baseline="0" noProof="0" dirty="0" smtClean="0">
+                <a:ln>
+                  <a:noFill/>
+                </a:ln>
+                <a:solidFill>
+                  <a:sysClr val="window" lastClr="FFFFFF"/>
+                </a:solidFill>
+                <a:effectLst/>
+                <a:uLnTx/>
+                <a:uFillTx/>
+                <a:latin typeface="Consolas"/>
+                <a:cs typeface="Consolas"/>
+              </a:rPr>
+              <a:t>breed </a:t>
+            </a:r>
+            <a:r>
+              <a:rPr kumimoji="0" lang="en-US" sz="1400" b="0" i="0" u="none" strike="noStrike" kern="0" cap="none" spc="0" normalizeH="0" baseline="0" noProof="0" dirty="0" smtClean="0">
+                <a:ln>
+                  <a:noFill/>
+                </a:ln>
+                <a:solidFill>
+                  <a:sysClr val="window" lastClr="FFFFFF"/>
+                </a:solidFill>
+                <a:effectLst/>
+                <a:uLnTx/>
+                <a:uFillTx/>
+                <a:latin typeface="Consolas"/>
+                <a:cs typeface="Consolas"/>
+              </a:rPr>
+              <a:t>the ultimate killing </a:t>
+            </a:r>
+            <a:r>
+              <a:rPr kumimoji="0" lang="en-US" sz="1400" b="0" i="0" u="none" strike="noStrike" kern="0" cap="none" spc="0" normalizeH="0" baseline="0" noProof="0" dirty="0" smtClean="0">
+                <a:ln>
+                  <a:noFill/>
+                </a:ln>
+                <a:solidFill>
+                  <a:sysClr val="window" lastClr="FFFFFF"/>
+                </a:solidFill>
+                <a:effectLst/>
+                <a:uLnTx/>
+                <a:uFillTx/>
+                <a:latin typeface="Consolas"/>
+                <a:cs typeface="Consolas"/>
+              </a:rPr>
+              <a:t>creature</a:t>
+            </a:r>
+            <a:endParaRPr kumimoji="0" lang="en-US" sz="1400" b="0" i="0" u="none" strike="noStrike" kern="0" cap="none" spc="0" normalizeH="0" baseline="0" noProof="0" dirty="0">
+              <a:ln>
+                <a:noFill/>
+              </a:ln>
+              <a:solidFill>
+                <a:sysClr val="window" lastClr="FFFFFF"/>
+              </a:solidFill>
+              <a:effectLst/>
+              <a:uLnTx/>
+              <a:uFillTx/>
+              <a:latin typeface="Consolas"/>
+              <a:cs typeface="Consolas"/>
+            </a:endParaRPr>
+          </a:p>
+        </p:txBody>
+      </p:sp>
+      <p:sp>
+        <p:nvSpPr>
+          <p:cNvPr id="14" name="TextBox 13"/>
+          <p:cNvSpPr txBox="1"/>
+          <p:nvPr/>
+        </p:nvSpPr>
+        <p:spPr>
+          <a:xfrm>
+            <a:off x="647485" y="1856999"/>
+            <a:ext cx="5874033" cy="523220"/>
+          </a:xfrm>
+          <a:prstGeom prst="rect">
+            <a:avLst/>
+          </a:prstGeom>
+          <a:noFill/>
+          <a:ln w="38100" cmpd="sng">
+            <a:noFill/>
+          </a:ln>
+        </p:spPr>
+        <p:txBody>
+          <a:bodyPr wrap="square" rtlCol="0">
+            <a:spAutoFit/>
+          </a:bodyPr>
+          <a:lstStyle/>
+          <a:p>
+            <a:pPr marL="0" marR="0" lvl="0" indent="0" defTabSz="914400" eaLnBrk="1" fontAlgn="auto" latinLnBrk="0" hangingPunct="1">
+              <a:lnSpc>
+                <a:spcPct val="100000"/>
+              </a:lnSpc>
+              <a:spcBef>
+                <a:spcPts val="0"/>
+              </a:spcBef>
+              <a:spcAft>
+                <a:spcPts val="0"/>
+              </a:spcAft>
+              <a:buClrTx/>
+              <a:buSzTx/>
+              <a:buFontTx/>
+              <a:buNone/>
+              <a:tabLst/>
+              <a:defRPr/>
+            </a:pPr>
+            <a:r>
+              <a:rPr kumimoji="0" lang="en-US" sz="1400" b="0" i="0" u="none" strike="noStrike" kern="0" cap="none" spc="0" normalizeH="0" baseline="0" noProof="0" dirty="0" smtClean="0">
+                <a:ln>
+                  <a:noFill/>
+                </a:ln>
+                <a:solidFill>
+                  <a:sysClr val="window" lastClr="FFFFFF"/>
+                </a:solidFill>
+                <a:effectLst/>
+                <a:uLnTx/>
+                <a:uFillTx/>
+                <a:latin typeface="Consolas"/>
+                <a:cs typeface="Consolas"/>
+              </a:rPr>
+              <a:t>Each creature has a unique neural network that makes decisions based</a:t>
+            </a:r>
+            <a:r>
+              <a:rPr kumimoji="0" lang="en-US" sz="1400" b="0" i="0" u="none" strike="noStrike" kern="0" cap="none" spc="0" normalizeH="0" noProof="0" dirty="0" smtClean="0">
+                <a:ln>
+                  <a:noFill/>
+                </a:ln>
+                <a:solidFill>
+                  <a:sysClr val="window" lastClr="FFFFFF"/>
+                </a:solidFill>
+                <a:effectLst/>
+                <a:uLnTx/>
+                <a:uFillTx/>
+                <a:latin typeface="Consolas"/>
+                <a:cs typeface="Consolas"/>
+              </a:rPr>
+              <a:t> on their surroundings</a:t>
+            </a:r>
+            <a:r>
+              <a:rPr kumimoji="0" lang="en-US" sz="1400" b="0" i="0" u="none" strike="noStrike" kern="0" cap="none" spc="0" normalizeH="0" baseline="0" noProof="0" dirty="0" smtClean="0">
+                <a:ln>
+                  <a:noFill/>
+                </a:ln>
+                <a:solidFill>
+                  <a:sysClr val="window" lastClr="FFFFFF"/>
+                </a:solidFill>
+                <a:effectLst/>
+                <a:uLnTx/>
+                <a:uFillTx/>
+                <a:latin typeface="Consolas"/>
+                <a:cs typeface="Consolas"/>
+              </a:rPr>
+              <a:t> </a:t>
+            </a:r>
+            <a:endParaRPr kumimoji="0" lang="en-US" sz="1400" b="0" i="0" u="none" strike="noStrike" kern="0" cap="none" spc="0" normalizeH="0" baseline="0" noProof="0" dirty="0">
+              <a:ln>
+                <a:noFill/>
+              </a:ln>
+              <a:solidFill>
+                <a:sysClr val="window" lastClr="FFFFFF"/>
+              </a:solidFill>
+              <a:effectLst/>
+              <a:uLnTx/>
+              <a:uFillTx/>
+              <a:latin typeface="Consolas"/>
+              <a:cs typeface="Consolas"/>
+            </a:endParaRPr>
+          </a:p>
+        </p:txBody>
+      </p:sp>
+      <p:sp>
+        <p:nvSpPr>
+          <p:cNvPr id="15" name="TextBox 14"/>
+          <p:cNvSpPr txBox="1"/>
+          <p:nvPr/>
+        </p:nvSpPr>
+        <p:spPr>
+          <a:xfrm>
+            <a:off x="647487" y="2776220"/>
+            <a:ext cx="4060478" cy="523220"/>
+          </a:xfrm>
+          <a:prstGeom prst="rect">
+            <a:avLst/>
+          </a:prstGeom>
+          <a:noFill/>
+          <a:ln w="38100" cmpd="sng">
+            <a:noFill/>
+          </a:ln>
+        </p:spPr>
+        <p:txBody>
+          <a:bodyPr wrap="square" rtlCol="0">
+            <a:spAutoFit/>
+          </a:bodyPr>
+          <a:lstStyle/>
+          <a:p>
+            <a:pPr marL="0" marR="0" lvl="0" indent="0" defTabSz="914400" eaLnBrk="1" fontAlgn="auto" latinLnBrk="0" hangingPunct="1">
+              <a:lnSpc>
+                <a:spcPct val="100000"/>
+              </a:lnSpc>
+              <a:spcBef>
+                <a:spcPts val="0"/>
+              </a:spcBef>
+              <a:spcAft>
+                <a:spcPts val="0"/>
+              </a:spcAft>
+              <a:buClrTx/>
+              <a:buSzTx/>
+              <a:buFontTx/>
+              <a:buNone/>
+              <a:tabLst/>
+              <a:defRPr/>
+            </a:pPr>
+            <a:r>
+              <a:rPr kumimoji="0" lang="en-US" sz="1400" b="0" i="0" u="none" strike="noStrike" kern="0" cap="none" spc="0" normalizeH="0" baseline="0" noProof="0" dirty="0" smtClean="0">
+                <a:ln>
+                  <a:noFill/>
+                </a:ln>
+                <a:solidFill>
+                  <a:sysClr val="window" lastClr="FFFFFF"/>
+                </a:solidFill>
+                <a:effectLst/>
+                <a:uLnTx/>
+                <a:uFillTx/>
+                <a:latin typeface="Consolas"/>
+                <a:cs typeface="Consolas"/>
+              </a:rPr>
+              <a:t>The creatures have </a:t>
+            </a:r>
+            <a:r>
+              <a:rPr kumimoji="0" lang="en-US" sz="1400" b="0" i="0" u="none" strike="noStrike" kern="0" cap="none" spc="0" normalizeH="0" baseline="0" noProof="0" dirty="0" smtClean="0">
+                <a:ln>
+                  <a:noFill/>
+                </a:ln>
+                <a:solidFill>
+                  <a:sysClr val="window" lastClr="FFFFFF"/>
+                </a:solidFill>
+                <a:effectLst/>
+                <a:uLnTx/>
+                <a:uFillTx/>
+                <a:latin typeface="Consolas"/>
+                <a:cs typeface="Consolas"/>
+              </a:rPr>
+              <a:t>2 eyes </a:t>
+            </a:r>
+            <a:r>
+              <a:rPr kumimoji="0" lang="en-US" sz="1400" b="0" i="0" u="none" strike="noStrike" kern="0" cap="none" spc="0" normalizeH="0" baseline="0" noProof="0" dirty="0" smtClean="0">
+                <a:ln>
+                  <a:noFill/>
+                </a:ln>
+                <a:solidFill>
+                  <a:sysClr val="window" lastClr="FFFFFF"/>
+                </a:solidFill>
+                <a:effectLst/>
+                <a:uLnTx/>
+                <a:uFillTx/>
+                <a:latin typeface="Consolas"/>
+                <a:cs typeface="Consolas"/>
+              </a:rPr>
+              <a:t>which </a:t>
+            </a:r>
+            <a:r>
+              <a:rPr kumimoji="0" lang="en-US" sz="1400" b="0" i="0" u="none" strike="noStrike" kern="0" cap="none" spc="0" normalizeH="0" baseline="0" noProof="0" dirty="0" smtClean="0">
+                <a:ln>
+                  <a:noFill/>
+                </a:ln>
+                <a:solidFill>
+                  <a:sysClr val="window" lastClr="FFFFFF"/>
+                </a:solidFill>
+                <a:effectLst/>
+                <a:uLnTx/>
+                <a:uFillTx/>
+                <a:latin typeface="Consolas"/>
+                <a:cs typeface="Consolas"/>
+              </a:rPr>
+              <a:t>detect the</a:t>
+            </a:r>
+            <a:r>
+              <a:rPr kumimoji="0" lang="en-US" sz="1400" b="0" i="0" u="none" strike="noStrike" kern="0" cap="none" spc="0" normalizeH="0" noProof="0" dirty="0" smtClean="0">
+                <a:ln>
+                  <a:noFill/>
+                </a:ln>
+                <a:solidFill>
+                  <a:sysClr val="window" lastClr="FFFFFF"/>
+                </a:solidFill>
+                <a:effectLst/>
+                <a:uLnTx/>
+                <a:uFillTx/>
+                <a:latin typeface="Consolas"/>
+                <a:cs typeface="Consolas"/>
+              </a:rPr>
+              <a:t> player as well as bullets</a:t>
+            </a:r>
+            <a:endParaRPr kumimoji="0" lang="en-US" sz="1400" b="0" i="0" u="none" strike="noStrike" kern="0" cap="none" spc="0" normalizeH="0" baseline="0" noProof="0" dirty="0">
+              <a:ln>
+                <a:noFill/>
+              </a:ln>
+              <a:solidFill>
+                <a:sysClr val="window" lastClr="FFFFFF"/>
+              </a:solidFill>
+              <a:effectLst/>
+              <a:uLnTx/>
+              <a:uFillTx/>
+              <a:latin typeface="Consolas"/>
+              <a:cs typeface="Consolas"/>
+            </a:endParaRPr>
+          </a:p>
+        </p:txBody>
+      </p:sp>
+      <p:sp>
+        <p:nvSpPr>
+          <p:cNvPr id="17" name="TextBox 16"/>
+          <p:cNvSpPr txBox="1"/>
+          <p:nvPr/>
+        </p:nvSpPr>
+        <p:spPr>
+          <a:xfrm>
+            <a:off x="3207942" y="4084288"/>
+            <a:ext cx="5874033" cy="523220"/>
+          </a:xfrm>
+          <a:prstGeom prst="rect">
+            <a:avLst/>
+          </a:prstGeom>
+          <a:noFill/>
+          <a:ln w="38100" cmpd="sng">
+            <a:noFill/>
+          </a:ln>
+        </p:spPr>
+        <p:txBody>
+          <a:bodyPr wrap="square" rtlCol="0">
+            <a:spAutoFit/>
+          </a:bodyPr>
+          <a:lstStyle/>
+          <a:p>
+            <a:pPr marL="0" marR="0" lvl="0" indent="0" defTabSz="914400" eaLnBrk="1" fontAlgn="auto" latinLnBrk="0" hangingPunct="1">
+              <a:lnSpc>
+                <a:spcPct val="100000"/>
+              </a:lnSpc>
+              <a:spcBef>
+                <a:spcPts val="0"/>
+              </a:spcBef>
+              <a:spcAft>
+                <a:spcPts val="0"/>
+              </a:spcAft>
+              <a:buClrTx/>
+              <a:buSzTx/>
+              <a:buFontTx/>
+              <a:buNone/>
+              <a:tabLst/>
+              <a:defRPr/>
+            </a:pPr>
+            <a:r>
+              <a:rPr kumimoji="0" lang="en-US" sz="1400" b="0" i="0" u="none" strike="noStrike" kern="0" cap="none" spc="0" normalizeH="0" baseline="0" noProof="0" dirty="0" smtClean="0">
+                <a:ln>
+                  <a:noFill/>
+                </a:ln>
+                <a:solidFill>
+                  <a:sysClr val="window" lastClr="FFFFFF"/>
+                </a:solidFill>
+                <a:effectLst/>
+                <a:uLnTx/>
+                <a:uFillTx/>
+                <a:latin typeface="Consolas"/>
+                <a:cs typeface="Consolas"/>
+              </a:rPr>
+              <a:t>Move using arrow keys and shoot creatures using the spacebar but be careful as shooting decreases your health</a:t>
+            </a:r>
+            <a:endParaRPr kumimoji="0" lang="en-US" sz="1400" b="0" i="0" u="none" strike="noStrike" kern="0" cap="none" spc="0" normalizeH="0" baseline="0" noProof="0" dirty="0">
+              <a:ln>
+                <a:noFill/>
+              </a:ln>
+              <a:solidFill>
+                <a:sysClr val="window" lastClr="FFFFFF"/>
+              </a:solidFill>
+              <a:effectLst/>
+              <a:uLnTx/>
+              <a:uFillTx/>
+              <a:latin typeface="Consolas"/>
+              <a:cs typeface="Consolas"/>
+            </a:endParaRPr>
+          </a:p>
+        </p:txBody>
+      </p:sp>
+      <p:pic>
+        <p:nvPicPr>
+          <p:cNvPr id="5" name="Picture 4" descr="Screen Shot 2018-07-26 at 5.01.09 PM.png"/>
+          <p:cNvPicPr>
+            <a:picLocks noChangeAspect="1"/>
+          </p:cNvPicPr>
+          <p:nvPr/>
+        </p:nvPicPr>
+        <p:blipFill>
+          <a:blip r:embed="rId3">
+            <a:extLst>
+              <a:ext uri="{28A0092B-C50C-407E-A947-70E740481C1C}">
+                <a14:useLocalDpi xmlns:a14="http://schemas.microsoft.com/office/drawing/2010/main" val="0"/>
+              </a:ext>
+            </a:extLst>
+          </a:blip>
+          <a:stretch>
+            <a:fillRect/>
+          </a:stretch>
+        </p:blipFill>
+        <p:spPr>
+          <a:xfrm>
+            <a:off x="7424737" y="1580226"/>
+            <a:ext cx="791550" cy="828365"/>
+          </a:xfrm>
+          <a:prstGeom prst="rect">
+            <a:avLst/>
+          </a:prstGeom>
+        </p:spPr>
+      </p:pic>
+    </p:spTree>
+    <p:extLst>
+      <p:ext uri="{BB962C8B-B14F-4D97-AF65-F5344CB8AC3E}">
+        <p14:creationId xmlns:p14="http://schemas.microsoft.com/office/powerpoint/2010/main" val="2469606694"/>
+      </p:ext>
+    </p:extLst>
+  </p:cSld>
+  <p:clrMapOvr>
+    <a:masterClrMapping/>
+  </p:clrMapOvr>
+</p:sld>
+</file>
+
+<file path=ppt/slides/slide2.xml><?xml version="1.0" encoding="utf-8"?>
+<p:sld xmlns:a="http://schemas.openxmlformats.org/drawingml/2006/main" xmlns:r="http://schemas.openxmlformats.org/officeDocument/2006/relationships" xmlns:p="http://schemas.openxmlformats.org/presentationml/2006/main">
+  <p:cSld>
+    <p:spTree>
+      <p:nvGrpSpPr>
+        <p:cNvPr id="1" name=""/>
+        <p:cNvGrpSpPr/>
+        <p:nvPr/>
+      </p:nvGrpSpPr>
+      <p:grpSpPr>
+        <a:xfrm>
+          <a:off x="0" y="0"/>
+          <a:ext cx="0" cy="0"/>
+          <a:chOff x="0" y="0"/>
+          <a:chExt cx="0" cy="0"/>
+        </a:xfrm>
+      </p:grpSpPr>
+      <p:sp>
+        <p:nvSpPr>
+          <p:cNvPr id="3" name="Rectangle 2"/>
+          <p:cNvSpPr/>
+          <p:nvPr/>
+        </p:nvSpPr>
+        <p:spPr>
+          <a:xfrm>
+            <a:off x="-1" y="0"/>
+            <a:ext cx="9528175" cy="5715000"/>
+          </a:xfrm>
+          <a:prstGeom prst="rect">
+            <a:avLst/>
+          </a:prstGeom>
+          <a:solidFill>
+            <a:srgbClr val="000000"/>
+          </a:solidFill>
+          <a:ln>
+            <a:noFill/>
+          </a:ln>
+          <a:effectLst/>
+        </p:spPr>
+        <p:style>
+          <a:lnRef idx="1">
+            <a:schemeClr val="accent1"/>
+          </a:lnRef>
+          <a:fillRef idx="3">
+            <a:schemeClr val="accent1"/>
+          </a:fillRef>
+          <a:effectRef idx="2">
+            <a:schemeClr val="accent1"/>
+          </a:effectRef>
+          <a:fontRef idx="minor">
+            <a:schemeClr val="lt1"/>
+          </a:fontRef>
+        </p:style>
+        <p:txBody>
+          <a:bodyPr rtlCol="0" anchor="ctr"/>
+          <a:lstStyle/>
+          <a:p>
+            <a:pPr algn="ctr"/>
+            <a:endParaRPr lang="en-US"/>
+          </a:p>
+        </p:txBody>
+      </p:sp>
+      <p:sp>
+        <p:nvSpPr>
+          <p:cNvPr id="11" name="TextBox 10"/>
+          <p:cNvSpPr txBox="1"/>
+          <p:nvPr/>
+        </p:nvSpPr>
+        <p:spPr>
+          <a:xfrm>
+            <a:off x="647486" y="1184451"/>
+            <a:ext cx="5874033" cy="523220"/>
+          </a:xfrm>
+          <a:prstGeom prst="rect">
+            <a:avLst/>
+          </a:prstGeom>
+          <a:noFill/>
+          <a:ln w="38100" cmpd="sng">
+            <a:noFill/>
+          </a:ln>
+        </p:spPr>
+        <p:txBody>
+          <a:bodyPr wrap="square" rtlCol="0">
+            <a:spAutoFit/>
+          </a:bodyPr>
+          <a:lstStyle/>
+          <a:p>
+            <a:pPr marL="0" marR="0" lvl="0" indent="0" defTabSz="914400" eaLnBrk="1" fontAlgn="auto" latinLnBrk="0" hangingPunct="1">
+              <a:lnSpc>
+                <a:spcPct val="100000"/>
+              </a:lnSpc>
+              <a:spcBef>
+                <a:spcPts val="0"/>
+              </a:spcBef>
+              <a:spcAft>
+                <a:spcPts val="0"/>
+              </a:spcAft>
+              <a:buClrTx/>
+              <a:buSzTx/>
+              <a:buFontTx/>
+              <a:buNone/>
+              <a:tabLst/>
+              <a:defRPr/>
+            </a:pPr>
+            <a:r>
+              <a:rPr kumimoji="0" lang="en-US" sz="1400" b="0" i="0" u="none" strike="noStrike" kern="0" cap="none" spc="0" normalizeH="0" baseline="0" noProof="0" dirty="0" smtClean="0">
+                <a:ln>
+                  <a:noFill/>
+                </a:ln>
+                <a:solidFill>
+                  <a:sysClr val="window" lastClr="FFFFFF"/>
+                </a:solidFill>
+                <a:effectLst/>
+                <a:uLnTx/>
+                <a:uFillTx/>
+                <a:latin typeface="Consolas"/>
+                <a:cs typeface="Consolas"/>
+              </a:rPr>
+              <a:t>Evil </a:t>
+            </a:r>
+            <a:r>
+              <a:rPr kumimoji="0" lang="en-US" sz="1400" b="0" i="0" u="none" strike="noStrike" kern="0" cap="none" spc="0" normalizeH="0" baseline="0" noProof="0" dirty="0" smtClean="0">
+                <a:ln>
+                  <a:noFill/>
+                </a:ln>
+                <a:solidFill>
+                  <a:sysClr val="window" lastClr="FFFFFF"/>
+                </a:solidFill>
+                <a:effectLst/>
+                <a:uLnTx/>
+                <a:uFillTx/>
+                <a:latin typeface="Consolas"/>
+                <a:cs typeface="Consolas"/>
+              </a:rPr>
+              <a:t>Dr. </a:t>
+            </a:r>
+            <a:r>
+              <a:rPr kumimoji="0" lang="en-US" sz="1400" b="0" i="0" u="none" strike="noStrike" kern="0" cap="none" spc="0" normalizeH="0" baseline="0" noProof="0" dirty="0" smtClean="0">
+                <a:ln>
+                  <a:noFill/>
+                </a:ln>
+                <a:solidFill>
+                  <a:sysClr val="window" lastClr="FFFFFF"/>
+                </a:solidFill>
+                <a:effectLst/>
+                <a:uLnTx/>
+                <a:uFillTx/>
+                <a:latin typeface="Consolas"/>
+                <a:cs typeface="Consolas"/>
+              </a:rPr>
+              <a:t>Darwin is planning to create the ultimate killing creature using evolution</a:t>
+            </a:r>
+            <a:endParaRPr kumimoji="0" lang="en-US" sz="1400" b="0" i="0" u="none" strike="noStrike" kern="0" cap="none" spc="0" normalizeH="0" baseline="0" noProof="0" dirty="0">
+              <a:ln>
+                <a:noFill/>
+              </a:ln>
+              <a:solidFill>
+                <a:sysClr val="window" lastClr="FFFFFF"/>
+              </a:solidFill>
+              <a:effectLst/>
+              <a:uLnTx/>
+              <a:uFillTx/>
+              <a:latin typeface="Consolas"/>
+              <a:cs typeface="Consolas"/>
+            </a:endParaRPr>
+          </a:p>
+        </p:txBody>
+      </p:sp>
+      <p:sp>
+        <p:nvSpPr>
+          <p:cNvPr id="14" name="TextBox 13"/>
+          <p:cNvSpPr txBox="1"/>
+          <p:nvPr/>
+        </p:nvSpPr>
+        <p:spPr>
+          <a:xfrm>
+            <a:off x="647486" y="2149027"/>
+            <a:ext cx="5874033" cy="523220"/>
+          </a:xfrm>
+          <a:prstGeom prst="rect">
+            <a:avLst/>
+          </a:prstGeom>
+          <a:noFill/>
+          <a:ln w="38100" cmpd="sng">
+            <a:noFill/>
+          </a:ln>
+        </p:spPr>
+        <p:txBody>
+          <a:bodyPr wrap="square" rtlCol="0">
+            <a:spAutoFit/>
+          </a:bodyPr>
+          <a:lstStyle/>
+          <a:p>
+            <a:pPr marL="0" marR="0" lvl="0" indent="0" defTabSz="914400" eaLnBrk="1" fontAlgn="auto" latinLnBrk="0" hangingPunct="1">
+              <a:lnSpc>
+                <a:spcPct val="100000"/>
+              </a:lnSpc>
+              <a:spcBef>
+                <a:spcPts val="0"/>
+              </a:spcBef>
+              <a:spcAft>
+                <a:spcPts val="0"/>
+              </a:spcAft>
+              <a:buClrTx/>
+              <a:buSzTx/>
+              <a:buFontTx/>
+              <a:buNone/>
+              <a:tabLst/>
+              <a:defRPr/>
+            </a:pPr>
+            <a:r>
+              <a:rPr kumimoji="0" lang="en-US" sz="1400" b="0" i="0" u="none" strike="noStrike" kern="0" cap="none" spc="0" normalizeH="0" baseline="0" noProof="0" dirty="0" smtClean="0">
+                <a:ln>
+                  <a:noFill/>
+                </a:ln>
+                <a:solidFill>
+                  <a:sysClr val="window" lastClr="FFFFFF"/>
+                </a:solidFill>
+                <a:effectLst/>
+                <a:uLnTx/>
+                <a:uFillTx/>
+                <a:latin typeface="Consolas"/>
+                <a:cs typeface="Consolas"/>
+              </a:rPr>
+              <a:t>This health bar shows you how much health the creature has left</a:t>
+            </a:r>
+            <a:endParaRPr kumimoji="0" lang="en-US" sz="1400" b="0" i="0" u="none" strike="noStrike" kern="0" cap="none" spc="0" normalizeH="0" baseline="0" noProof="0" dirty="0">
+              <a:ln>
+                <a:noFill/>
+              </a:ln>
+              <a:solidFill>
+                <a:sysClr val="window" lastClr="FFFFFF"/>
+              </a:solidFill>
+              <a:effectLst/>
+              <a:uLnTx/>
+              <a:uFillTx/>
+              <a:latin typeface="Consolas"/>
+              <a:cs typeface="Consolas"/>
+            </a:endParaRPr>
+          </a:p>
+        </p:txBody>
+      </p:sp>
+      <p:sp>
+        <p:nvSpPr>
+          <p:cNvPr id="15" name="TextBox 14"/>
+          <p:cNvSpPr txBox="1"/>
+          <p:nvPr/>
+        </p:nvSpPr>
+        <p:spPr>
+          <a:xfrm>
+            <a:off x="647486" y="2776220"/>
+            <a:ext cx="5874033" cy="523220"/>
+          </a:xfrm>
+          <a:prstGeom prst="rect">
+            <a:avLst/>
+          </a:prstGeom>
+          <a:noFill/>
+          <a:ln w="38100" cmpd="sng">
+            <a:noFill/>
+          </a:ln>
+        </p:spPr>
+        <p:txBody>
+          <a:bodyPr wrap="square" rtlCol="0">
+            <a:spAutoFit/>
+          </a:bodyPr>
+          <a:lstStyle/>
+          <a:p>
+            <a:pPr marL="0" marR="0" lvl="0" indent="0" defTabSz="914400" eaLnBrk="1" fontAlgn="auto" latinLnBrk="0" hangingPunct="1">
+              <a:lnSpc>
+                <a:spcPct val="100000"/>
+              </a:lnSpc>
+              <a:spcBef>
+                <a:spcPts val="0"/>
+              </a:spcBef>
+              <a:spcAft>
+                <a:spcPts val="0"/>
+              </a:spcAft>
+              <a:buClrTx/>
+              <a:buSzTx/>
+              <a:buFontTx/>
+              <a:buNone/>
+              <a:tabLst/>
+              <a:defRPr/>
+            </a:pPr>
+            <a:r>
+              <a:rPr kumimoji="0" lang="en-US" sz="1400" b="0" i="0" u="none" strike="noStrike" kern="0" cap="none" spc="0" normalizeH="0" baseline="0" noProof="0" dirty="0" smtClean="0">
+                <a:ln>
+                  <a:noFill/>
+                </a:ln>
+                <a:solidFill>
+                  <a:sysClr val="window" lastClr="FFFFFF"/>
+                </a:solidFill>
+                <a:effectLst/>
+                <a:uLnTx/>
+                <a:uFillTx/>
+                <a:latin typeface="Consolas"/>
+                <a:cs typeface="Consolas"/>
+              </a:rPr>
+              <a:t>The creatures have eyes which turn green when they detect you in their periphery</a:t>
+            </a:r>
+            <a:endParaRPr kumimoji="0" lang="en-US" sz="1400" b="0" i="0" u="none" strike="noStrike" kern="0" cap="none" spc="0" normalizeH="0" baseline="0" noProof="0" dirty="0">
+              <a:ln>
+                <a:noFill/>
+              </a:ln>
+              <a:solidFill>
+                <a:sysClr val="window" lastClr="FFFFFF"/>
+              </a:solidFill>
+              <a:effectLst/>
+              <a:uLnTx/>
+              <a:uFillTx/>
+              <a:latin typeface="Consolas"/>
+              <a:cs typeface="Consolas"/>
+            </a:endParaRPr>
+          </a:p>
+        </p:txBody>
+      </p:sp>
+      <p:sp>
+        <p:nvSpPr>
+          <p:cNvPr id="17" name="TextBox 16"/>
+          <p:cNvSpPr txBox="1"/>
+          <p:nvPr/>
+        </p:nvSpPr>
+        <p:spPr>
+          <a:xfrm>
+            <a:off x="3207942" y="4084288"/>
+            <a:ext cx="5874033" cy="553998"/>
+          </a:xfrm>
+          <a:prstGeom prst="rect">
+            <a:avLst/>
+          </a:prstGeom>
+          <a:noFill/>
+          <a:ln w="38100" cmpd="sng">
+            <a:noFill/>
+          </a:ln>
+        </p:spPr>
+        <p:txBody>
+          <a:bodyPr wrap="square" rtlCol="0">
+            <a:spAutoFit/>
+          </a:bodyPr>
+          <a:lstStyle/>
+          <a:p>
+            <a:pPr marL="0" marR="0" lvl="0" indent="0" defTabSz="914400" eaLnBrk="1" fontAlgn="auto" latinLnBrk="0" hangingPunct="1">
+              <a:lnSpc>
+                <a:spcPct val="100000"/>
+              </a:lnSpc>
+              <a:spcBef>
+                <a:spcPts val="0"/>
+              </a:spcBef>
+              <a:spcAft>
+                <a:spcPts val="0"/>
+              </a:spcAft>
+              <a:buClrTx/>
+              <a:buSzTx/>
+              <a:buFontTx/>
+              <a:buNone/>
+              <a:tabLst/>
+              <a:defRPr/>
+            </a:pPr>
+            <a:r>
+              <a:rPr kumimoji="0" lang="en-US" sz="1400" b="0" i="0" u="none" strike="noStrike" kern="0" cap="none" spc="0" normalizeH="0" baseline="0" noProof="0" dirty="0" smtClean="0">
+                <a:ln>
+                  <a:noFill/>
+                </a:ln>
+                <a:solidFill>
+                  <a:sysClr val="window" lastClr="FFFFFF"/>
+                </a:solidFill>
+                <a:effectLst/>
+                <a:uLnTx/>
+                <a:uFillTx/>
+                <a:latin typeface="Consolas"/>
+                <a:cs typeface="Consolas"/>
+              </a:rPr>
+              <a:t>Move using arrow keys and shoot creatures using the spacebar</a:t>
+            </a:r>
+            <a:r>
               <a:rPr kumimoji="0" lang="en-US" sz="1600" b="0" i="0" u="none" strike="noStrike" kern="0" cap="none" spc="0" normalizeH="0" baseline="0" noProof="0" dirty="0" smtClean="0">
                 <a:ln>
                   <a:noFill/>
@@ -3156,10 +4550,10 @@
                 <a:latin typeface="Consolas"/>
                 <a:cs typeface="Consolas"/>
               </a:rPr>
-              <a:t>Evil </a:t>
-            </a:r>
-            <a:r>
-              <a:rPr kumimoji="0" lang="en-US" sz="1600" b="0" i="0" u="none" strike="noStrike" kern="0" cap="none" spc="0" normalizeH="0" baseline="0" noProof="0" dirty="0" err="1" smtClean="0">
+              <a:t> </a:t>
+            </a:r>
+            <a:r>
+              <a:rPr kumimoji="0" lang="en-US" sz="1400" b="0" i="0" u="none" strike="noStrike" kern="0" cap="none" spc="0" normalizeH="0" baseline="0" noProof="0" dirty="0" smtClean="0">
                 <a:ln>
                   <a:noFill/>
                 </a:ln>
@@ -3172,25 +4566,9 @@
                 <a:latin typeface="Consolas"/>
                 <a:cs typeface="Consolas"/>
               </a:rPr>
-              <a:t>Dr</a:t>
-            </a:r>
-            <a:r>
-              <a:rPr kumimoji="0" lang="en-US" sz="1600" b="0" i="0" u="none" strike="noStrike" kern="0" cap="none" spc="0" normalizeH="0" baseline="0" noProof="0" dirty="0" smtClean="0">
-                <a:ln>
-                  <a:noFill/>
-                </a:ln>
-                <a:solidFill>
-                  <a:sysClr val="window" lastClr="FFFFFF"/>
-                </a:solidFill>
-                <a:effectLst/>
-                <a:uLnTx/>
-                <a:uFillTx/>
-                <a:latin typeface="Consolas"/>
-                <a:cs typeface="Consolas"/>
-              </a:rPr>
-              <a:t> Darwin is planning to create the ultimate killing creature using evolution</a:t>
-            </a:r>
-            <a:endParaRPr kumimoji="0" lang="en-US" sz="1600" b="0" i="0" u="none" strike="noStrike" kern="0" cap="none" spc="0" normalizeH="0" baseline="0" noProof="0" dirty="0">
+              <a:t>but be careful as shooting decreases your health</a:t>
+            </a:r>
+            <a:endParaRPr kumimoji="0" lang="en-US" sz="1400" b="0" i="0" u="none" strike="noStrike" kern="0" cap="none" spc="0" normalizeH="0" baseline="0" noProof="0" dirty="0">
               <a:ln>
                 <a:noFill/>
               </a:ln>
@@ -3208,7 +4586,7 @@
       </p:sp>
       <p:pic>
         <p:nvPicPr>
-          <p:cNvPr id="12" name="Picture 11" descr="darwin.bmp"/>
+          <p:cNvPr id="4" name="Picture 3" descr="Screen Shot 2018-07-26 at 4.59.08 PM.png"/>
           <p:cNvPicPr>
             <a:picLocks noChangeAspect="1"/>
           </p:cNvPicPr>
@@ -3228,338 +4606,18 @@
         </p:blipFill>
         <p:spPr>
           <a:xfrm>
-            <a:off x="647486" y="1161623"/>
-            <a:ext cx="596146" cy="596146"/>
+            <a:off x="6636841" y="1347020"/>
+            <a:ext cx="1175556" cy="844413"/>
           </a:xfrm>
           <a:prstGeom prst="rect">
             <a:avLst/>
           </a:prstGeom>
         </p:spPr>
       </p:pic>
-      <p:pic>
-        <p:nvPicPr>
-          <p:cNvPr id="13" name="Picture 12" descr="Screen Shot 2018-07-14 at 2.31.13 PM.png"/>
-          <p:cNvPicPr>
-            <a:picLocks noChangeAspect="1"/>
-          </p:cNvPicPr>
-          <p:nvPr/>
-        </p:nvPicPr>
-        <p:blipFill rotWithShape="1">
-          <a:blip r:embed="rId3">
-            <a:extLst>
-              <a:ext uri="{28A0092B-C50C-407E-A947-70E740481C1C}">
-                <a14:useLocalDpi xmlns:a14="http://schemas.microsoft.com/office/drawing/2010/main" val="0"/>
-              </a:ext>
-            </a:extLst>
-          </a:blip>
-          <a:srcRect l="17682" t="60765" r="17250" b="8675"/>
-          <a:stretch/>
-        </p:blipFill>
-        <p:spPr>
-          <a:xfrm>
-            <a:off x="6851020" y="2613674"/>
-            <a:ext cx="838650" cy="532263"/>
-          </a:xfrm>
-          <a:prstGeom prst="rect">
-            <a:avLst/>
-          </a:prstGeom>
-        </p:spPr>
-      </p:pic>
-      <p:sp>
-        <p:nvSpPr>
-          <p:cNvPr id="14" name="TextBox 13"/>
-          <p:cNvSpPr txBox="1"/>
-          <p:nvPr/>
-        </p:nvSpPr>
-        <p:spPr>
-          <a:xfrm>
-            <a:off x="647486" y="2163085"/>
-            <a:ext cx="5874033" cy="584776"/>
-          </a:xfrm>
-          <a:prstGeom prst="rect">
-            <a:avLst/>
-          </a:prstGeom>
-          <a:noFill/>
-          <a:ln w="38100" cmpd="sng">
-            <a:noFill/>
-          </a:ln>
-        </p:spPr>
-        <p:txBody>
-          <a:bodyPr wrap="square" rtlCol="0">
-            <a:spAutoFit/>
-          </a:bodyPr>
-          <a:lstStyle/>
-          <a:p>
-            <a:pPr marL="0" marR="0" lvl="0" indent="0" defTabSz="914400" eaLnBrk="1" fontAlgn="auto" latinLnBrk="0" hangingPunct="1">
-              <a:lnSpc>
-                <a:spcPct val="100000"/>
-              </a:lnSpc>
-              <a:spcBef>
-                <a:spcPts val="0"/>
-              </a:spcBef>
-              <a:spcAft>
-                <a:spcPts val="0"/>
-              </a:spcAft>
-              <a:buClrTx/>
-              <a:buSzTx/>
-              <a:buFontTx/>
-              <a:buNone/>
-              <a:tabLst/>
-              <a:defRPr/>
-            </a:pPr>
-            <a:r>
-              <a:rPr kumimoji="0" lang="en-US" sz="1600" b="0" i="0" u="none" strike="noStrike" kern="0" cap="none" spc="0" normalizeH="0" baseline="0" noProof="0" dirty="0" smtClean="0">
-                <a:ln>
-                  <a:noFill/>
-                </a:ln>
-                <a:solidFill>
-                  <a:sysClr val="window" lastClr="FFFFFF"/>
-                </a:solidFill>
-                <a:effectLst/>
-                <a:uLnTx/>
-                <a:uFillTx/>
-                <a:latin typeface="Consolas"/>
-                <a:cs typeface="Consolas"/>
-              </a:rPr>
-              <a:t>This health bar shows you how much health the creature has left</a:t>
-            </a:r>
-            <a:endParaRPr kumimoji="0" lang="en-US" sz="1600" b="0" i="0" u="none" strike="noStrike" kern="0" cap="none" spc="0" normalizeH="0" baseline="0" noProof="0" dirty="0">
-              <a:ln>
-                <a:noFill/>
-              </a:ln>
-              <a:solidFill>
-                <a:sysClr val="window" lastClr="FFFFFF"/>
-              </a:solidFill>
-              <a:effectLst/>
-              <a:uLnTx/>
-              <a:uFillTx/>
-              <a:latin typeface="Consolas"/>
-              <a:cs typeface="Consolas"/>
-            </a:endParaRPr>
-          </a:p>
-        </p:txBody>
-      </p:sp>
-      <p:sp>
-        <p:nvSpPr>
-          <p:cNvPr id="15" name="TextBox 14"/>
-          <p:cNvSpPr txBox="1"/>
-          <p:nvPr/>
-        </p:nvSpPr>
-        <p:spPr>
-          <a:xfrm>
-            <a:off x="647486" y="2776220"/>
-            <a:ext cx="5874033" cy="584776"/>
-          </a:xfrm>
-          <a:prstGeom prst="rect">
-            <a:avLst/>
-          </a:prstGeom>
-          <a:noFill/>
-          <a:ln w="38100" cmpd="sng">
-            <a:noFill/>
-          </a:ln>
-        </p:spPr>
-        <p:txBody>
-          <a:bodyPr wrap="square" rtlCol="0">
-            <a:spAutoFit/>
-          </a:bodyPr>
-          <a:lstStyle/>
-          <a:p>
-            <a:pPr marL="0" marR="0" lvl="0" indent="0" defTabSz="914400" eaLnBrk="1" fontAlgn="auto" latinLnBrk="0" hangingPunct="1">
-              <a:lnSpc>
-                <a:spcPct val="100000"/>
-              </a:lnSpc>
-              <a:spcBef>
-                <a:spcPts val="0"/>
-              </a:spcBef>
-              <a:spcAft>
-                <a:spcPts val="0"/>
-              </a:spcAft>
-              <a:buClrTx/>
-              <a:buSzTx/>
-              <a:buFontTx/>
-              <a:buNone/>
-              <a:tabLst/>
-              <a:defRPr/>
-            </a:pPr>
-            <a:r>
-              <a:rPr kumimoji="0" lang="en-US" sz="1600" b="0" i="0" u="none" strike="noStrike" kern="0" cap="none" spc="0" normalizeH="0" baseline="0" noProof="0" dirty="0" smtClean="0">
-                <a:ln>
-                  <a:noFill/>
-                </a:ln>
-                <a:solidFill>
-                  <a:sysClr val="window" lastClr="FFFFFF"/>
-                </a:solidFill>
-                <a:effectLst/>
-                <a:uLnTx/>
-                <a:uFillTx/>
-                <a:latin typeface="Consolas"/>
-                <a:cs typeface="Consolas"/>
-              </a:rPr>
-              <a:t>The creatures have eyes which turn green when they detect you in their periphery</a:t>
-            </a:r>
-            <a:endParaRPr kumimoji="0" lang="en-US" sz="1600" b="0" i="0" u="none" strike="noStrike" kern="0" cap="none" spc="0" normalizeH="0" baseline="0" noProof="0" dirty="0">
-              <a:ln>
-                <a:noFill/>
-              </a:ln>
-              <a:solidFill>
-                <a:sysClr val="window" lastClr="FFFFFF"/>
-              </a:solidFill>
-              <a:effectLst/>
-              <a:uLnTx/>
-              <a:uFillTx/>
-              <a:latin typeface="Consolas"/>
-              <a:cs typeface="Consolas"/>
-            </a:endParaRPr>
-          </a:p>
-        </p:txBody>
-      </p:sp>
-      <p:sp>
-        <p:nvSpPr>
-          <p:cNvPr id="16" name="Isosceles Triangle 15"/>
-          <p:cNvSpPr/>
-          <p:nvPr/>
-        </p:nvSpPr>
-        <p:spPr>
-          <a:xfrm rot="18759158">
-            <a:off x="6954856" y="2868717"/>
-            <a:ext cx="925714" cy="302688"/>
-          </a:xfrm>
-          <a:prstGeom prst="triangle">
-            <a:avLst/>
-          </a:prstGeom>
-          <a:solidFill>
-            <a:sysClr val="window" lastClr="FFFFFF">
-              <a:alpha val="44000"/>
-            </a:sysClr>
-          </a:solidFill>
-          <a:ln w="9525" cap="flat" cmpd="sng" algn="ctr">
-            <a:noFill/>
-            <a:prstDash val="solid"/>
-          </a:ln>
-          <a:effectLst>
-            <a:outerShdw blurRad="40000" dist="23000" dir="5400000" rotWithShape="0">
-              <a:srgbClr val="000000">
-                <a:alpha val="35000"/>
-              </a:srgbClr>
-            </a:outerShdw>
-          </a:effectLst>
-        </p:spPr>
-        <p:txBody>
-          <a:bodyPr rtlCol="0" anchor="ctr"/>
-          <a:lstStyle/>
-          <a:p>
-            <a:pPr marL="0" marR="0" lvl="0" indent="0" algn="ctr" defTabSz="914400" eaLnBrk="1" fontAlgn="auto" latinLnBrk="0" hangingPunct="1">
-              <a:lnSpc>
-                <a:spcPct val="100000"/>
-              </a:lnSpc>
-              <a:spcBef>
-                <a:spcPts val="0"/>
-              </a:spcBef>
-              <a:spcAft>
-                <a:spcPts val="0"/>
-              </a:spcAft>
-              <a:buClrTx/>
-              <a:buSzTx/>
-              <a:buFontTx/>
-              <a:buNone/>
-              <a:tabLst/>
-              <a:defRPr/>
-            </a:pPr>
-            <a:endParaRPr kumimoji="0" lang="en-US" sz="1800" b="0" i="0" u="none" strike="noStrike" kern="0" cap="none" spc="0" normalizeH="0" baseline="0" noProof="0" smtClean="0">
-              <a:ln>
-                <a:noFill/>
-              </a:ln>
-              <a:solidFill>
-                <a:sysClr val="window" lastClr="FFFFFF"/>
-              </a:solidFill>
-              <a:effectLst/>
-              <a:uLnTx/>
-              <a:uFillTx/>
-              <a:latin typeface="Calibri"/>
-              <a:ea typeface="+mn-ea"/>
-              <a:cs typeface="+mn-cs"/>
-            </a:endParaRPr>
-          </a:p>
-        </p:txBody>
-      </p:sp>
-      <p:sp>
-        <p:nvSpPr>
-          <p:cNvPr id="17" name="TextBox 16"/>
-          <p:cNvSpPr txBox="1"/>
-          <p:nvPr/>
-        </p:nvSpPr>
-        <p:spPr>
-          <a:xfrm>
-            <a:off x="3207942" y="4499787"/>
-            <a:ext cx="5874033" cy="830997"/>
-          </a:xfrm>
-          <a:prstGeom prst="rect">
-            <a:avLst/>
-          </a:prstGeom>
-          <a:noFill/>
-          <a:ln w="38100" cmpd="sng">
-            <a:noFill/>
-          </a:ln>
-        </p:spPr>
-        <p:txBody>
-          <a:bodyPr wrap="square" rtlCol="0">
-            <a:spAutoFit/>
-          </a:bodyPr>
-          <a:lstStyle/>
-          <a:p>
-            <a:pPr marL="0" marR="0" lvl="0" indent="0" defTabSz="914400" eaLnBrk="1" fontAlgn="auto" latinLnBrk="0" hangingPunct="1">
-              <a:lnSpc>
-                <a:spcPct val="100000"/>
-              </a:lnSpc>
-              <a:spcBef>
-                <a:spcPts val="0"/>
-              </a:spcBef>
-              <a:spcAft>
-                <a:spcPts val="0"/>
-              </a:spcAft>
-              <a:buClrTx/>
-              <a:buSzTx/>
-              <a:buFontTx/>
-              <a:buNone/>
-              <a:tabLst/>
-              <a:defRPr/>
-            </a:pPr>
-            <a:r>
-              <a:rPr kumimoji="0" lang="en-US" sz="1600" b="0" i="0" u="none" strike="noStrike" kern="0" cap="none" spc="0" normalizeH="0" baseline="0" noProof="0" dirty="0" smtClean="0">
-                <a:ln>
-                  <a:noFill/>
-                </a:ln>
-                <a:solidFill>
-                  <a:sysClr val="window" lastClr="FFFFFF"/>
-                </a:solidFill>
-                <a:effectLst/>
-                <a:uLnTx/>
-                <a:uFillTx/>
-                <a:latin typeface="Consolas"/>
-                <a:cs typeface="Consolas"/>
-              </a:rPr>
-              <a:t>Move using arrow keys and shoot creatures using the spacebar but be careful as shooting decreases your health</a:t>
-            </a:r>
-            <a:endParaRPr kumimoji="0" lang="en-US" sz="1600" b="0" i="0" u="none" strike="noStrike" kern="0" cap="none" spc="0" normalizeH="0" baseline="0" noProof="0" dirty="0">
-              <a:ln>
-                <a:noFill/>
-              </a:ln>
-              <a:solidFill>
-                <a:sysClr val="window" lastClr="FFFFFF"/>
-              </a:solidFill>
-              <a:effectLst/>
-              <a:uLnTx/>
-              <a:uFillTx/>
-              <a:latin typeface="Consolas"/>
-              <a:cs typeface="Consolas"/>
-            </a:endParaRPr>
-          </a:p>
-        </p:txBody>
-      </p:sp>
     </p:spTree>
     <p:extLst>
       <p:ext uri="{BB962C8B-B14F-4D97-AF65-F5344CB8AC3E}">
-        <p14:creationId xmlns:p14="http://schemas.microsoft.com/office/powerpoint/2010/main" val="2469606694"/>
+        <p14:creationId xmlns:p14="http://schemas.microsoft.com/office/powerpoint/2010/main" val="2614285645"/>
       </p:ext>
     </p:extLst>
   </p:cSld>
@@ -3569,7 +4627,7 @@
 </p:sld>
 </file>
 
-<file path=ppt/slides/slide2.xml><?xml version="1.0" encoding="utf-8"?>
+<file path=ppt/slides/slide3.xml><?xml version="1.0" encoding="utf-8"?>
 <p:sld xmlns:a="http://schemas.openxmlformats.org/drawingml/2006/main" xmlns:r="http://schemas.openxmlformats.org/officeDocument/2006/relationships" xmlns:p="http://schemas.openxmlformats.org/presentationml/2006/main">
   <p:cSld>
     <p:spTree>
@@ -3696,8 +4754,537 @@
 </p:sld>
 </file>
 
+<file path=ppt/slides/slide4.xml><?xml version="1.0" encoding="utf-8"?>
+<p:sld xmlns:a="http://schemas.openxmlformats.org/drawingml/2006/main" xmlns:r="http://schemas.openxmlformats.org/officeDocument/2006/relationships" xmlns:p="http://schemas.openxmlformats.org/presentationml/2006/main">
+  <p:cSld>
+    <p:spTree>
+      <p:nvGrpSpPr>
+        <p:cNvPr id="1" name=""/>
+        <p:cNvGrpSpPr/>
+        <p:nvPr/>
+      </p:nvGrpSpPr>
+      <p:grpSpPr>
+        <a:xfrm>
+          <a:off x="0" y="0"/>
+          <a:ext cx="0" cy="0"/>
+          <a:chOff x="0" y="0"/>
+          <a:chExt cx="0" cy="0"/>
+        </a:xfrm>
+      </p:grpSpPr>
+      <p:sp>
+        <p:nvSpPr>
+          <p:cNvPr id="3" name="Rectangle 2"/>
+          <p:cNvSpPr/>
+          <p:nvPr/>
+        </p:nvSpPr>
+        <p:spPr>
+          <a:xfrm>
+            <a:off x="-1" y="0"/>
+            <a:ext cx="9528175" cy="5715000"/>
+          </a:xfrm>
+          <a:prstGeom prst="rect">
+            <a:avLst/>
+          </a:prstGeom>
+          <a:solidFill>
+            <a:srgbClr val="000000"/>
+          </a:solidFill>
+          <a:ln>
+            <a:noFill/>
+          </a:ln>
+          <a:effectLst/>
+        </p:spPr>
+        <p:style>
+          <a:lnRef idx="1">
+            <a:schemeClr val="accent1"/>
+          </a:lnRef>
+          <a:fillRef idx="3">
+            <a:schemeClr val="accent1"/>
+          </a:fillRef>
+          <a:effectRef idx="2">
+            <a:schemeClr val="accent1"/>
+          </a:effectRef>
+          <a:fontRef idx="minor">
+            <a:schemeClr val="lt1"/>
+          </a:fontRef>
+        </p:style>
+        <p:txBody>
+          <a:bodyPr rtlCol="0" anchor="ctr"/>
+          <a:lstStyle/>
+          <a:p>
+            <a:pPr algn="ctr"/>
+            <a:endParaRPr lang="en-US"/>
+          </a:p>
+        </p:txBody>
+      </p:sp>
+      <p:sp>
+        <p:nvSpPr>
+          <p:cNvPr id="11" name="TextBox 10"/>
+          <p:cNvSpPr txBox="1"/>
+          <p:nvPr/>
+        </p:nvSpPr>
+        <p:spPr>
+          <a:xfrm>
+            <a:off x="647486" y="1184451"/>
+            <a:ext cx="5874033" cy="523220"/>
+          </a:xfrm>
+          <a:prstGeom prst="rect">
+            <a:avLst/>
+          </a:prstGeom>
+          <a:noFill/>
+          <a:ln w="38100" cmpd="sng">
+            <a:noFill/>
+          </a:ln>
+        </p:spPr>
+        <p:txBody>
+          <a:bodyPr wrap="square" rtlCol="0">
+            <a:spAutoFit/>
+          </a:bodyPr>
+          <a:lstStyle/>
+          <a:p>
+            <a:pPr marL="0" marR="0" lvl="0" indent="0" defTabSz="914400" eaLnBrk="1" fontAlgn="auto" latinLnBrk="0" hangingPunct="1">
+              <a:lnSpc>
+                <a:spcPct val="100000"/>
+              </a:lnSpc>
+              <a:spcBef>
+                <a:spcPts val="0"/>
+              </a:spcBef>
+              <a:spcAft>
+                <a:spcPts val="0"/>
+              </a:spcAft>
+              <a:buClrTx/>
+              <a:buSzTx/>
+              <a:buFontTx/>
+              <a:buNone/>
+              <a:tabLst/>
+              <a:defRPr/>
+            </a:pPr>
+            <a:r>
+              <a:rPr kumimoji="0" lang="en-US" sz="1400" b="0" i="0" u="none" strike="noStrike" kern="0" cap="none" spc="0" normalizeH="0" baseline="0" noProof="0" dirty="0" smtClean="0">
+                <a:ln>
+                  <a:noFill/>
+                </a:ln>
+                <a:solidFill>
+                  <a:sysClr val="window" lastClr="FFFFFF"/>
+                </a:solidFill>
+                <a:effectLst/>
+                <a:uLnTx/>
+                <a:uFillTx/>
+                <a:latin typeface="Consolas"/>
+                <a:cs typeface="Consolas"/>
+              </a:rPr>
+              <a:t>Evil </a:t>
+            </a:r>
+            <a:r>
+              <a:rPr kumimoji="0" lang="en-US" sz="1400" b="0" i="0" u="none" strike="noStrike" kern="0" cap="none" spc="0" normalizeH="0" baseline="0" noProof="0" dirty="0" smtClean="0">
+                <a:ln>
+                  <a:noFill/>
+                </a:ln>
+                <a:solidFill>
+                  <a:sysClr val="window" lastClr="FFFFFF"/>
+                </a:solidFill>
+                <a:effectLst/>
+                <a:uLnTx/>
+                <a:uFillTx/>
+                <a:latin typeface="Consolas"/>
+                <a:cs typeface="Consolas"/>
+              </a:rPr>
+              <a:t>Dr. </a:t>
+            </a:r>
+            <a:r>
+              <a:rPr kumimoji="0" lang="en-US" sz="1400" b="0" i="0" u="none" strike="noStrike" kern="0" cap="none" spc="0" normalizeH="0" baseline="0" noProof="0" dirty="0" smtClean="0">
+                <a:ln>
+                  <a:noFill/>
+                </a:ln>
+                <a:solidFill>
+                  <a:sysClr val="window" lastClr="FFFFFF"/>
+                </a:solidFill>
+                <a:effectLst/>
+                <a:uLnTx/>
+                <a:uFillTx/>
+                <a:latin typeface="Consolas"/>
+                <a:cs typeface="Consolas"/>
+              </a:rPr>
+              <a:t>Darwin is planning to create the ultimate killing creature using evolution</a:t>
+            </a:r>
+            <a:endParaRPr kumimoji="0" lang="en-US" sz="1400" b="0" i="0" u="none" strike="noStrike" kern="0" cap="none" spc="0" normalizeH="0" baseline="0" noProof="0" dirty="0">
+              <a:ln>
+                <a:noFill/>
+              </a:ln>
+              <a:solidFill>
+                <a:sysClr val="window" lastClr="FFFFFF"/>
+              </a:solidFill>
+              <a:effectLst/>
+              <a:uLnTx/>
+              <a:uFillTx/>
+              <a:latin typeface="Consolas"/>
+              <a:cs typeface="Consolas"/>
+            </a:endParaRPr>
+          </a:p>
+        </p:txBody>
+      </p:sp>
+      <p:sp>
+        <p:nvSpPr>
+          <p:cNvPr id="14" name="TextBox 13"/>
+          <p:cNvSpPr txBox="1"/>
+          <p:nvPr/>
+        </p:nvSpPr>
+        <p:spPr>
+          <a:xfrm>
+            <a:off x="647486" y="2149027"/>
+            <a:ext cx="5874033" cy="523220"/>
+          </a:xfrm>
+          <a:prstGeom prst="rect">
+            <a:avLst/>
+          </a:prstGeom>
+          <a:noFill/>
+          <a:ln w="38100" cmpd="sng">
+            <a:noFill/>
+          </a:ln>
+        </p:spPr>
+        <p:txBody>
+          <a:bodyPr wrap="square" rtlCol="0">
+            <a:spAutoFit/>
+          </a:bodyPr>
+          <a:lstStyle/>
+          <a:p>
+            <a:pPr marL="0" marR="0" lvl="0" indent="0" defTabSz="914400" eaLnBrk="1" fontAlgn="auto" latinLnBrk="0" hangingPunct="1">
+              <a:lnSpc>
+                <a:spcPct val="100000"/>
+              </a:lnSpc>
+              <a:spcBef>
+                <a:spcPts val="0"/>
+              </a:spcBef>
+              <a:spcAft>
+                <a:spcPts val="0"/>
+              </a:spcAft>
+              <a:buClrTx/>
+              <a:buSzTx/>
+              <a:buFontTx/>
+              <a:buNone/>
+              <a:tabLst/>
+              <a:defRPr/>
+            </a:pPr>
+            <a:r>
+              <a:rPr kumimoji="0" lang="en-US" sz="1400" b="0" i="0" u="none" strike="noStrike" kern="0" cap="none" spc="0" normalizeH="0" baseline="0" noProof="0" dirty="0" smtClean="0">
+                <a:ln>
+                  <a:noFill/>
+                </a:ln>
+                <a:solidFill>
+                  <a:sysClr val="window" lastClr="FFFFFF"/>
+                </a:solidFill>
+                <a:effectLst/>
+                <a:uLnTx/>
+                <a:uFillTx/>
+                <a:latin typeface="Consolas"/>
+                <a:cs typeface="Consolas"/>
+              </a:rPr>
+              <a:t>Each creature has a unique neural network that makes decisions based</a:t>
+            </a:r>
+            <a:r>
+              <a:rPr kumimoji="0" lang="en-US" sz="1400" b="0" i="0" u="none" strike="noStrike" kern="0" cap="none" spc="0" normalizeH="0" noProof="0" dirty="0" smtClean="0">
+                <a:ln>
+                  <a:noFill/>
+                </a:ln>
+                <a:solidFill>
+                  <a:sysClr val="window" lastClr="FFFFFF"/>
+                </a:solidFill>
+                <a:effectLst/>
+                <a:uLnTx/>
+                <a:uFillTx/>
+                <a:latin typeface="Consolas"/>
+                <a:cs typeface="Consolas"/>
+              </a:rPr>
+              <a:t> on their surroundings</a:t>
+            </a:r>
+            <a:r>
+              <a:rPr kumimoji="0" lang="en-US" sz="1400" b="0" i="0" u="none" strike="noStrike" kern="0" cap="none" spc="0" normalizeH="0" baseline="0" noProof="0" dirty="0" smtClean="0">
+                <a:ln>
+                  <a:noFill/>
+                </a:ln>
+                <a:solidFill>
+                  <a:sysClr val="window" lastClr="FFFFFF"/>
+                </a:solidFill>
+                <a:effectLst/>
+                <a:uLnTx/>
+                <a:uFillTx/>
+                <a:latin typeface="Consolas"/>
+                <a:cs typeface="Consolas"/>
+              </a:rPr>
+              <a:t> </a:t>
+            </a:r>
+            <a:endParaRPr kumimoji="0" lang="en-US" sz="1400" b="0" i="0" u="none" strike="noStrike" kern="0" cap="none" spc="0" normalizeH="0" baseline="0" noProof="0" dirty="0">
+              <a:ln>
+                <a:noFill/>
+              </a:ln>
+              <a:solidFill>
+                <a:sysClr val="window" lastClr="FFFFFF"/>
+              </a:solidFill>
+              <a:effectLst/>
+              <a:uLnTx/>
+              <a:uFillTx/>
+              <a:latin typeface="Consolas"/>
+              <a:cs typeface="Consolas"/>
+            </a:endParaRPr>
+          </a:p>
+        </p:txBody>
+      </p:sp>
+      <p:sp>
+        <p:nvSpPr>
+          <p:cNvPr id="15" name="TextBox 14"/>
+          <p:cNvSpPr txBox="1"/>
+          <p:nvPr/>
+        </p:nvSpPr>
+        <p:spPr>
+          <a:xfrm>
+            <a:off x="647486" y="2776220"/>
+            <a:ext cx="5874033" cy="523220"/>
+          </a:xfrm>
+          <a:prstGeom prst="rect">
+            <a:avLst/>
+          </a:prstGeom>
+          <a:noFill/>
+          <a:ln w="38100" cmpd="sng">
+            <a:noFill/>
+          </a:ln>
+        </p:spPr>
+        <p:txBody>
+          <a:bodyPr wrap="square" rtlCol="0">
+            <a:spAutoFit/>
+          </a:bodyPr>
+          <a:lstStyle/>
+          <a:p>
+            <a:pPr marL="0" marR="0" lvl="0" indent="0" defTabSz="914400" eaLnBrk="1" fontAlgn="auto" latinLnBrk="0" hangingPunct="1">
+              <a:lnSpc>
+                <a:spcPct val="100000"/>
+              </a:lnSpc>
+              <a:spcBef>
+                <a:spcPts val="0"/>
+              </a:spcBef>
+              <a:spcAft>
+                <a:spcPts val="0"/>
+              </a:spcAft>
+              <a:buClrTx/>
+              <a:buSzTx/>
+              <a:buFontTx/>
+              <a:buNone/>
+              <a:tabLst/>
+              <a:defRPr/>
+            </a:pPr>
+            <a:r>
+              <a:rPr kumimoji="0" lang="en-US" sz="1400" b="0" i="0" u="none" strike="noStrike" kern="0" cap="none" spc="0" normalizeH="0" baseline="0" noProof="0" dirty="0" smtClean="0">
+                <a:ln>
+                  <a:noFill/>
+                </a:ln>
+                <a:solidFill>
+                  <a:sysClr val="window" lastClr="FFFFFF"/>
+                </a:solidFill>
+                <a:effectLst/>
+                <a:uLnTx/>
+                <a:uFillTx/>
+                <a:latin typeface="Consolas"/>
+                <a:cs typeface="Consolas"/>
+              </a:rPr>
+              <a:t>The creatures have </a:t>
+            </a:r>
+            <a:r>
+              <a:rPr kumimoji="0" lang="en-US" sz="1400" b="0" i="0" u="none" strike="noStrike" kern="0" cap="none" spc="0" normalizeH="0" baseline="0" noProof="0" dirty="0" smtClean="0">
+                <a:ln>
+                  <a:noFill/>
+                </a:ln>
+                <a:solidFill>
+                  <a:sysClr val="window" lastClr="FFFFFF"/>
+                </a:solidFill>
+                <a:effectLst/>
+                <a:uLnTx/>
+                <a:uFillTx/>
+                <a:latin typeface="Consolas"/>
+                <a:cs typeface="Consolas"/>
+              </a:rPr>
+              <a:t>2 eyes </a:t>
+            </a:r>
+            <a:r>
+              <a:rPr kumimoji="0" lang="en-US" sz="1400" b="0" i="0" u="none" strike="noStrike" kern="0" cap="none" spc="0" normalizeH="0" baseline="0" noProof="0" dirty="0" smtClean="0">
+                <a:ln>
+                  <a:noFill/>
+                </a:ln>
+                <a:solidFill>
+                  <a:sysClr val="window" lastClr="FFFFFF"/>
+                </a:solidFill>
+                <a:effectLst/>
+                <a:uLnTx/>
+                <a:uFillTx/>
+                <a:latin typeface="Consolas"/>
+                <a:cs typeface="Consolas"/>
+              </a:rPr>
+              <a:t>which </a:t>
+            </a:r>
+            <a:r>
+              <a:rPr kumimoji="0" lang="en-US" sz="1400" b="0" i="0" u="none" strike="noStrike" kern="0" cap="none" spc="0" normalizeH="0" baseline="0" noProof="0" dirty="0" smtClean="0">
+                <a:ln>
+                  <a:noFill/>
+                </a:ln>
+                <a:solidFill>
+                  <a:sysClr val="window" lastClr="FFFFFF"/>
+                </a:solidFill>
+                <a:effectLst/>
+                <a:uLnTx/>
+                <a:uFillTx/>
+                <a:latin typeface="Consolas"/>
+                <a:cs typeface="Consolas"/>
+              </a:rPr>
+              <a:t>detect the</a:t>
+            </a:r>
+            <a:r>
+              <a:rPr kumimoji="0" lang="en-US" sz="1400" b="0" i="0" u="none" strike="noStrike" kern="0" cap="none" spc="0" normalizeH="0" noProof="0" dirty="0" smtClean="0">
+                <a:ln>
+                  <a:noFill/>
+                </a:ln>
+                <a:solidFill>
+                  <a:sysClr val="window" lastClr="FFFFFF"/>
+                </a:solidFill>
+                <a:effectLst/>
+                <a:uLnTx/>
+                <a:uFillTx/>
+                <a:latin typeface="Consolas"/>
+                <a:cs typeface="Consolas"/>
+              </a:rPr>
+              <a:t> player as well as bullets</a:t>
+            </a:r>
+            <a:endParaRPr kumimoji="0" lang="en-US" sz="1400" b="0" i="0" u="none" strike="noStrike" kern="0" cap="none" spc="0" normalizeH="0" baseline="0" noProof="0" dirty="0">
+              <a:ln>
+                <a:noFill/>
+              </a:ln>
+              <a:solidFill>
+                <a:sysClr val="window" lastClr="FFFFFF"/>
+              </a:solidFill>
+              <a:effectLst/>
+              <a:uLnTx/>
+              <a:uFillTx/>
+              <a:latin typeface="Consolas"/>
+              <a:cs typeface="Consolas"/>
+            </a:endParaRPr>
+          </a:p>
+        </p:txBody>
+      </p:sp>
+      <p:sp>
+        <p:nvSpPr>
+          <p:cNvPr id="17" name="TextBox 16"/>
+          <p:cNvSpPr txBox="1"/>
+          <p:nvPr/>
+        </p:nvSpPr>
+        <p:spPr>
+          <a:xfrm>
+            <a:off x="3207942" y="4084288"/>
+            <a:ext cx="5874033" cy="523220"/>
+          </a:xfrm>
+          <a:prstGeom prst="rect">
+            <a:avLst/>
+          </a:prstGeom>
+          <a:noFill/>
+          <a:ln w="38100" cmpd="sng">
+            <a:noFill/>
+          </a:ln>
+        </p:spPr>
+        <p:txBody>
+          <a:bodyPr wrap="square" rtlCol="0">
+            <a:spAutoFit/>
+          </a:bodyPr>
+          <a:lstStyle/>
+          <a:p>
+            <a:pPr marL="0" marR="0" lvl="0" indent="0" defTabSz="914400" eaLnBrk="1" fontAlgn="auto" latinLnBrk="0" hangingPunct="1">
+              <a:lnSpc>
+                <a:spcPct val="100000"/>
+              </a:lnSpc>
+              <a:spcBef>
+                <a:spcPts val="0"/>
+              </a:spcBef>
+              <a:spcAft>
+                <a:spcPts val="0"/>
+              </a:spcAft>
+              <a:buClrTx/>
+              <a:buSzTx/>
+              <a:buFontTx/>
+              <a:buNone/>
+              <a:tabLst/>
+              <a:defRPr/>
+            </a:pPr>
+            <a:r>
+              <a:rPr kumimoji="0" lang="en-US" sz="1400" b="0" i="0" u="none" strike="noStrike" kern="0" cap="none" spc="0" normalizeH="0" baseline="0" noProof="0" dirty="0" smtClean="0">
+                <a:ln>
+                  <a:noFill/>
+                </a:ln>
+                <a:solidFill>
+                  <a:sysClr val="window" lastClr="FFFFFF"/>
+                </a:solidFill>
+                <a:effectLst/>
+                <a:uLnTx/>
+                <a:uFillTx/>
+                <a:latin typeface="Consolas"/>
+                <a:cs typeface="Consolas"/>
+              </a:rPr>
+              <a:t>Move using arrow keys and shoot creatures using the spacebar but be careful as shooting decreases your health</a:t>
+            </a:r>
+            <a:endParaRPr kumimoji="0" lang="en-US" sz="1400" b="0" i="0" u="none" strike="noStrike" kern="0" cap="none" spc="0" normalizeH="0" baseline="0" noProof="0" dirty="0">
+              <a:ln>
+                <a:noFill/>
+              </a:ln>
+              <a:solidFill>
+                <a:sysClr val="window" lastClr="FFFFFF"/>
+              </a:solidFill>
+              <a:effectLst/>
+              <a:uLnTx/>
+              <a:uFillTx/>
+              <a:latin typeface="Consolas"/>
+              <a:cs typeface="Consolas"/>
+            </a:endParaRPr>
+          </a:p>
+        </p:txBody>
+      </p:sp>
+      <p:pic>
+        <p:nvPicPr>
+          <p:cNvPr id="5" name="Picture 4" descr="Screen Shot 2018-07-26 at 5.01.09 PM.png"/>
+          <p:cNvPicPr>
+            <a:picLocks noChangeAspect="1"/>
+          </p:cNvPicPr>
+          <p:nvPr/>
+        </p:nvPicPr>
+        <p:blipFill>
+          <a:blip r:embed="rId2">
+            <a:extLst>
+              <a:ext uri="{28A0092B-C50C-407E-A947-70E740481C1C}">
+                <a14:useLocalDpi xmlns:a14="http://schemas.microsoft.com/office/drawing/2010/main" val="0"/>
+              </a:ext>
+            </a:extLst>
+          </a:blip>
+          <a:stretch>
+            <a:fillRect/>
+          </a:stretch>
+        </p:blipFill>
+        <p:spPr>
+          <a:xfrm>
+            <a:off x="6863865" y="1404335"/>
+            <a:ext cx="791550" cy="828365"/>
+          </a:xfrm>
+          <a:prstGeom prst="rect">
+            <a:avLst/>
+          </a:prstGeom>
+        </p:spPr>
+      </p:pic>
+    </p:spTree>
+    <p:extLst>
+      <p:ext uri="{BB962C8B-B14F-4D97-AF65-F5344CB8AC3E}">
+        <p14:creationId xmlns:p14="http://schemas.microsoft.com/office/powerpoint/2010/main" val="2838566785"/>
+      </p:ext>
+    </p:extLst>
+  </p:cSld>
+  <p:clrMapOvr>
+    <a:masterClrMapping/>
+  </p:clrMapOvr>
+</p:sld>
+</file>
+
 <file path=ppt/theme/theme1.xml><?xml version="1.0" encoding="utf-8"?>
-<a:theme xmlns:a="http://schemas.openxmlformats.org/drawingml/2006/main" name="Black">
+<a:theme xmlns:a="http://schemas.openxmlformats.org/drawingml/2006/main" name="Office Theme">
   <a:themeElements>
     <a:clrScheme name="Office">
       <a:dk1>
@@ -3841,20 +5428,16 @@
           <a:gsLst>
             <a:gs pos="0">
               <a:schemeClr val="phClr">
-                <a:shade val="51000"/>
-                <a:satMod val="130000"/>
-              </a:schemeClr>
-            </a:gs>
-            <a:gs pos="80000">
-              <a:schemeClr val="phClr">
-                <a:shade val="93000"/>
+                <a:tint val="100000"/>
+                <a:shade val="100000"/>
                 <a:satMod val="130000"/>
               </a:schemeClr>
             </a:gs>
             <a:gs pos="100000">
               <a:schemeClr val="phClr">
-                <a:shade val="94000"/>
-                <a:satMod val="135000"/>
+                <a:tint val="50000"/>
+                <a:shade val="100000"/>
+                <a:satMod val="350000"/>
               </a:schemeClr>
             </a:gs>
           </a:gsLst>
@@ -3976,7 +5559,366 @@
       </a:bgFillStyleLst>
     </a:fmtScheme>
   </a:themeElements>
-  <a:objectDefaults/>
+  <a:objectDefaults>
+    <a:spDef>
+      <a:spPr/>
+      <a:bodyPr/>
+      <a:lstStyle/>
+      <a:style>
+        <a:lnRef idx="1">
+          <a:schemeClr val="accent1"/>
+        </a:lnRef>
+        <a:fillRef idx="3">
+          <a:schemeClr val="accent1"/>
+        </a:fillRef>
+        <a:effectRef idx="2">
+          <a:schemeClr val="accent1"/>
+        </a:effectRef>
+        <a:fontRef idx="minor">
+          <a:schemeClr val="lt1"/>
+        </a:fontRef>
+      </a:style>
+    </a:spDef>
+    <a:lnDef>
+      <a:spPr/>
+      <a:bodyPr/>
+      <a:lstStyle/>
+      <a:style>
+        <a:lnRef idx="2">
+          <a:schemeClr val="accent1"/>
+        </a:lnRef>
+        <a:fillRef idx="0">
+          <a:schemeClr val="accent1"/>
+        </a:fillRef>
+        <a:effectRef idx="1">
+          <a:schemeClr val="accent1"/>
+        </a:effectRef>
+        <a:fontRef idx="minor">
+          <a:schemeClr val="tx1"/>
+        </a:fontRef>
+      </a:style>
+    </a:lnDef>
+  </a:objectDefaults>
+  <a:extraClrSchemeLst/>
+</a:theme>
+</file>
+
+<file path=ppt/theme/theme2.xml><?xml version="1.0" encoding="utf-8"?>
+<a:theme xmlns:a="http://schemas.openxmlformats.org/drawingml/2006/main" name="Office Theme">
+  <a:themeElements>
+    <a:clrScheme name="Office">
+      <a:dk1>
+        <a:sysClr val="windowText" lastClr="000000"/>
+      </a:dk1>
+      <a:lt1>
+        <a:sysClr val="window" lastClr="FFFFFF"/>
+      </a:lt1>
+      <a:dk2>
+        <a:srgbClr val="1F497D"/>
+      </a:dk2>
+      <a:lt2>
+        <a:srgbClr val="EEECE1"/>
+      </a:lt2>
+      <a:accent1>
+        <a:srgbClr val="4F81BD"/>
+      </a:accent1>
+      <a:accent2>
+        <a:srgbClr val="C0504D"/>
+      </a:accent2>
+      <a:accent3>
+        <a:srgbClr val="9BBB59"/>
+      </a:accent3>
+      <a:accent4>
+        <a:srgbClr val="8064A2"/>
+      </a:accent4>
+      <a:accent5>
+        <a:srgbClr val="4BACC6"/>
+      </a:accent5>
+      <a:accent6>
+        <a:srgbClr val="F79646"/>
+      </a:accent6>
+      <a:hlink>
+        <a:srgbClr val="0000FF"/>
+      </a:hlink>
+      <a:folHlink>
+        <a:srgbClr val="800080"/>
+      </a:folHlink>
+    </a:clrScheme>
+    <a:fontScheme name="Office">
+      <a:majorFont>
+        <a:latin typeface="Calibri"/>
+        <a:ea typeface=""/>
+        <a:cs typeface=""/>
+        <a:font script="Jpan" typeface="ＭＳ Ｐゴシック"/>
+        <a:font script="Hang" typeface="맑은 고딕"/>
+        <a:font script="Hans" typeface="宋体"/>
+        <a:font script="Hant" typeface="新細明體"/>
+        <a:font script="Arab" typeface="Times New Roman"/>
+        <a:font script="Hebr" typeface="Times New Roman"/>
+        <a:font script="Thai" typeface="Angsana New"/>
+        <a:font script="Ethi" typeface="Nyala"/>
+        <a:font script="Beng" typeface="Vrinda"/>
+        <a:font script="Gujr" typeface="Shruti"/>
+        <a:font script="Khmr" typeface="MoolBoran"/>
+        <a:font script="Knda" typeface="Tunga"/>
+        <a:font script="Guru" typeface="Raavi"/>
+        <a:font script="Cans" typeface="Euphemia"/>
+        <a:font script="Cher" typeface="Plantagenet Cherokee"/>
+        <a:font script="Yiii" typeface="Microsoft Yi Baiti"/>
+        <a:font script="Tibt" typeface="Microsoft Himalaya"/>
+        <a:font script="Thaa" typeface="MV Boli"/>
+        <a:font script="Deva" typeface="Mangal"/>
+        <a:font script="Telu" typeface="Gautami"/>
+        <a:font script="Taml" typeface="Latha"/>
+        <a:font script="Syrc" typeface="Estrangelo Edessa"/>
+        <a:font script="Orya" typeface="Kalinga"/>
+        <a:font script="Mlym" typeface="Kartika"/>
+        <a:font script="Laoo" typeface="DokChampa"/>
+        <a:font script="Sinh" typeface="Iskoola Pota"/>
+        <a:font script="Mong" typeface="Mongolian Baiti"/>
+        <a:font script="Viet" typeface="Times New Roman"/>
+        <a:font script="Uigh" typeface="Microsoft Uighur"/>
+        <a:font script="Geor" typeface="Sylfaen"/>
+      </a:majorFont>
+      <a:minorFont>
+        <a:latin typeface="Calibri"/>
+        <a:ea typeface=""/>
+        <a:cs typeface=""/>
+        <a:font script="Jpan" typeface="ＭＳ Ｐゴシック"/>
+        <a:font script="Hang" typeface="맑은 고딕"/>
+        <a:font script="Hans" typeface="宋体"/>
+        <a:font script="Hant" typeface="新細明體"/>
+        <a:font script="Arab" typeface="Arial"/>
+        <a:font script="Hebr" typeface="Arial"/>
+        <a:font script="Thai" typeface="Cordia New"/>
+        <a:font script="Ethi" typeface="Nyala"/>
+        <a:font script="Beng" typeface="Vrinda"/>
+        <a:font script="Gujr" typeface="Shruti"/>
+        <a:font script="Khmr" typeface="DaunPenh"/>
+        <a:font script="Knda" typeface="Tunga"/>
+        <a:font script="Guru" typeface="Raavi"/>
+        <a:font script="Cans" typeface="Euphemia"/>
+        <a:font script="Cher" typeface="Plantagenet Cherokee"/>
+        <a:font script="Yiii" typeface="Microsoft Yi Baiti"/>
+        <a:font script="Tibt" typeface="Microsoft Himalaya"/>
+        <a:font script="Thaa" typeface="MV Boli"/>
+        <a:font script="Deva" typeface="Mangal"/>
+        <a:font script="Telu" typeface="Gautami"/>
+        <a:font script="Taml" typeface="Latha"/>
+        <a:font script="Syrc" typeface="Estrangelo Edessa"/>
+        <a:font script="Orya" typeface="Kalinga"/>
+        <a:font script="Mlym" typeface="Kartika"/>
+        <a:font script="Laoo" typeface="DokChampa"/>
+        <a:font script="Sinh" typeface="Iskoola Pota"/>
+        <a:font script="Mong" typeface="Mongolian Baiti"/>
+        <a:font script="Viet" typeface="Arial"/>
+        <a:font script="Uigh" typeface="Microsoft Uighur"/>
+        <a:font script="Geor" typeface="Sylfaen"/>
+      </a:minorFont>
+    </a:fontScheme>
+    <a:fmtScheme name="Office">
+      <a:fillStyleLst>
+        <a:solidFill>
+          <a:schemeClr val="phClr"/>
+        </a:solidFill>
+        <a:gradFill rotWithShape="1">
+          <a:gsLst>
+            <a:gs pos="0">
+              <a:schemeClr val="phClr">
+                <a:tint val="50000"/>
+                <a:satMod val="300000"/>
+              </a:schemeClr>
+            </a:gs>
+            <a:gs pos="35000">
+              <a:schemeClr val="phClr">
+                <a:tint val="37000"/>
+                <a:satMod val="300000"/>
+              </a:schemeClr>
+            </a:gs>
+            <a:gs pos="100000">
+              <a:schemeClr val="phClr">
+                <a:tint val="15000"/>
+                <a:satMod val="350000"/>
+              </a:schemeClr>
+            </a:gs>
+          </a:gsLst>
+          <a:lin ang="16200000" scaled="1"/>
+        </a:gradFill>
+        <a:gradFill rotWithShape="1">
+          <a:gsLst>
+            <a:gs pos="0">
+              <a:schemeClr val="phClr">
+                <a:tint val="100000"/>
+                <a:shade val="100000"/>
+                <a:satMod val="130000"/>
+              </a:schemeClr>
+            </a:gs>
+            <a:gs pos="100000">
+              <a:schemeClr val="phClr">
+                <a:tint val="50000"/>
+                <a:shade val="100000"/>
+                <a:satMod val="350000"/>
+              </a:schemeClr>
+            </a:gs>
+          </a:gsLst>
+          <a:lin ang="16200000" scaled="0"/>
+        </a:gradFill>
+      </a:fillStyleLst>
+      <a:lnStyleLst>
+        <a:ln w="9525" cap="flat" cmpd="sng" algn="ctr">
+          <a:solidFill>
+            <a:schemeClr val="phClr">
+              <a:shade val="95000"/>
+              <a:satMod val="105000"/>
+            </a:schemeClr>
+          </a:solidFill>
+          <a:prstDash val="solid"/>
+        </a:ln>
+        <a:ln w="25400" cap="flat" cmpd="sng" algn="ctr">
+          <a:solidFill>
+            <a:schemeClr val="phClr"/>
+          </a:solidFill>
+          <a:prstDash val="solid"/>
+        </a:ln>
+        <a:ln w="38100" cap="flat" cmpd="sng" algn="ctr">
+          <a:solidFill>
+            <a:schemeClr val="phClr"/>
+          </a:solidFill>
+          <a:prstDash val="solid"/>
+        </a:ln>
+      </a:lnStyleLst>
+      <a:effectStyleLst>
+        <a:effectStyle>
+          <a:effectLst>
+            <a:outerShdw blurRad="40000" dist="20000" dir="5400000" rotWithShape="0">
+              <a:srgbClr val="000000">
+                <a:alpha val="38000"/>
+              </a:srgbClr>
+            </a:outerShdw>
+          </a:effectLst>
+        </a:effectStyle>
+        <a:effectStyle>
+          <a:effectLst>
+            <a:outerShdw blurRad="40000" dist="23000" dir="5400000" rotWithShape="0">
+              <a:srgbClr val="000000">
+                <a:alpha val="35000"/>
+              </a:srgbClr>
+            </a:outerShdw>
+          </a:effectLst>
+        </a:effectStyle>
+        <a:effectStyle>
+          <a:effectLst>
+            <a:outerShdw blurRad="40000" dist="23000" dir="5400000" rotWithShape="0">
+              <a:srgbClr val="000000">
+                <a:alpha val="35000"/>
+              </a:srgbClr>
+            </a:outerShdw>
+          </a:effectLst>
+          <a:scene3d>
+            <a:camera prst="orthographicFront">
+              <a:rot lat="0" lon="0" rev="0"/>
+            </a:camera>
+            <a:lightRig rig="threePt" dir="t">
+              <a:rot lat="0" lon="0" rev="1200000"/>
+            </a:lightRig>
+          </a:scene3d>
+          <a:sp3d>
+            <a:bevelT w="63500" h="25400"/>
+          </a:sp3d>
+        </a:effectStyle>
+      </a:effectStyleLst>
+      <a:bgFillStyleLst>
+        <a:solidFill>
+          <a:schemeClr val="phClr"/>
+        </a:solidFill>
+        <a:gradFill rotWithShape="1">
+          <a:gsLst>
+            <a:gs pos="0">
+              <a:schemeClr val="phClr">
+                <a:tint val="40000"/>
+                <a:satMod val="350000"/>
+              </a:schemeClr>
+            </a:gs>
+            <a:gs pos="40000">
+              <a:schemeClr val="phClr">
+                <a:tint val="45000"/>
+                <a:shade val="99000"/>
+                <a:satMod val="350000"/>
+              </a:schemeClr>
+            </a:gs>
+            <a:gs pos="100000">
+              <a:schemeClr val="phClr">
+                <a:shade val="20000"/>
+                <a:satMod val="255000"/>
+              </a:schemeClr>
+            </a:gs>
+          </a:gsLst>
+          <a:path path="circle">
+            <a:fillToRect l="50000" t="-80000" r="50000" b="180000"/>
+          </a:path>
+        </a:gradFill>
+        <a:gradFill rotWithShape="1">
+          <a:gsLst>
+            <a:gs pos="0">
+              <a:schemeClr val="phClr">
+                <a:tint val="80000"/>
+                <a:satMod val="300000"/>
+              </a:schemeClr>
+            </a:gs>
+            <a:gs pos="100000">
+              <a:schemeClr val="phClr">
+                <a:shade val="30000"/>
+                <a:satMod val="200000"/>
+              </a:schemeClr>
+            </a:gs>
+          </a:gsLst>
+          <a:path path="circle">
+            <a:fillToRect l="50000" t="50000" r="50000" b="50000"/>
+          </a:path>
+        </a:gradFill>
+      </a:bgFillStyleLst>
+    </a:fmtScheme>
+  </a:themeElements>
+  <a:objectDefaults>
+    <a:spDef>
+      <a:spPr/>
+      <a:bodyPr/>
+      <a:lstStyle/>
+      <a:style>
+        <a:lnRef idx="1">
+          <a:schemeClr val="accent1"/>
+        </a:lnRef>
+        <a:fillRef idx="3">
+          <a:schemeClr val="accent1"/>
+        </a:fillRef>
+        <a:effectRef idx="2">
+          <a:schemeClr val="accent1"/>
+        </a:effectRef>
+        <a:fontRef idx="minor">
+          <a:schemeClr val="lt1"/>
+        </a:fontRef>
+      </a:style>
+    </a:spDef>
+    <a:lnDef>
+      <a:spPr/>
+      <a:bodyPr/>
+      <a:lstStyle/>
+      <a:style>
+        <a:lnRef idx="2">
+          <a:schemeClr val="accent1"/>
+        </a:lnRef>
+        <a:fillRef idx="0">
+          <a:schemeClr val="accent1"/>
+        </a:fillRef>
+        <a:effectRef idx="1">
+          <a:schemeClr val="accent1"/>
+        </a:effectRef>
+        <a:fontRef idx="minor">
+          <a:schemeClr val="tx1"/>
+        </a:fontRef>
+      </a:style>
+    </a:lnDef>
+  </a:objectDefaults>
   <a:extraClrSchemeLst/>
 </a:theme>
 </file>
</xml_diff>